<commit_message>
Updated files and Locations
</commit_message>
<xml_diff>
--- a/z.ReadMeAssets/UTAH Github.pptx
+++ b/z.ReadMeAssets/UTAH Github.pptx
@@ -8092,222 +8092,264 @@
           </a:prstGeom>
         </p:spPr>
       </p:pic>
-      <p:sp>
-        <p:nvSpPr>
-          <p:cNvPr id="31" name="Arrow: Right 30">
-            <a:extLst>
-              <a:ext uri="{FF2B5EF4-FFF2-40B4-BE49-F238E27FC236}">
-                <a16:creationId xmlns:a16="http://schemas.microsoft.com/office/drawing/2014/main" id="{EA56CE58-C3C1-15A7-12B9-A2A007E84C38}"/>
-              </a:ext>
-            </a:extLst>
-          </p:cNvPr>
-          <p:cNvSpPr/>
+      <p:grpSp>
+        <p:nvGrpSpPr>
+          <p:cNvPr id="2" name="Group 1">
+            <a:extLst>
+              <a:ext uri="{FF2B5EF4-FFF2-40B4-BE49-F238E27FC236}">
+                <a16:creationId xmlns:a16="http://schemas.microsoft.com/office/drawing/2014/main" id="{CCEFCCF8-6063-2809-5FAA-6E7A7AF1DFF9}"/>
+              </a:ext>
+            </a:extLst>
+          </p:cNvPr>
+          <p:cNvGrpSpPr/>
           <p:nvPr/>
-        </p:nvSpPr>
-        <p:spPr>
-          <a:xfrm rot="5400000">
-            <a:off x="7988997" y="4248185"/>
-            <a:ext cx="2920434" cy="212062"/>
-          </a:xfrm>
-          <a:prstGeom prst="rightArrow">
-            <a:avLst/>
-          </a:prstGeom>
-          <a:solidFill>
-            <a:srgbClr val="0070C0"/>
-          </a:solidFill>
-          <a:ln>
+        </p:nvGrpSpPr>
+        <p:grpSpPr>
+          <a:xfrm rot="10800000">
+            <a:off x="9343183" y="2893999"/>
+            <a:ext cx="499852" cy="2920436"/>
+            <a:chOff x="9343183" y="2893999"/>
+            <a:chExt cx="499852" cy="2920436"/>
+          </a:xfrm>
+        </p:grpSpPr>
+        <p:sp>
+          <p:nvSpPr>
+            <p:cNvPr id="31" name="Arrow: Right 30">
+              <a:extLst>
+                <a:ext uri="{FF2B5EF4-FFF2-40B4-BE49-F238E27FC236}">
+                  <a16:creationId xmlns:a16="http://schemas.microsoft.com/office/drawing/2014/main" id="{EA56CE58-C3C1-15A7-12B9-A2A007E84C38}"/>
+                </a:ext>
+              </a:extLst>
+            </p:cNvPr>
+            <p:cNvSpPr/>
+            <p:nvPr/>
+          </p:nvSpPr>
+          <p:spPr>
+            <a:xfrm rot="5400000">
+              <a:off x="7988997" y="4248185"/>
+              <a:ext cx="2920434" cy="212062"/>
+            </a:xfrm>
+            <a:prstGeom prst="rightArrow">
+              <a:avLst/>
+            </a:prstGeom>
             <a:solidFill>
-              <a:srgbClr val="002060"/>
+              <a:srgbClr val="0070C0"/>
             </a:solidFill>
-          </a:ln>
-        </p:spPr>
-        <p:style>
-          <a:lnRef idx="2">
-            <a:schemeClr val="accent1">
-              <a:shade val="15000"/>
-            </a:schemeClr>
-          </a:lnRef>
-          <a:fillRef idx="1">
-            <a:schemeClr val="accent1"/>
-          </a:fillRef>
-          <a:effectRef idx="0">
-            <a:schemeClr val="accent1"/>
-          </a:effectRef>
-          <a:fontRef idx="minor">
-            <a:schemeClr val="lt1"/>
-          </a:fontRef>
-        </p:style>
-        <p:txBody>
-          <a:bodyPr rtlCol="0" anchor="ctr"/>
-          <a:lstStyle/>
-          <a:p>
-            <a:pPr algn="ctr"/>
-            <a:endParaRPr lang="en-US" dirty="0"/>
-          </a:p>
-        </p:txBody>
-      </p:sp>
-      <p:sp>
-        <p:nvSpPr>
-          <p:cNvPr id="32" name="Arrow: Right 31">
-            <a:extLst>
-              <a:ext uri="{FF2B5EF4-FFF2-40B4-BE49-F238E27FC236}">
-                <a16:creationId xmlns:a16="http://schemas.microsoft.com/office/drawing/2014/main" id="{2A293891-649B-D3A5-13BF-DC5A49D57273}"/>
-              </a:ext>
-            </a:extLst>
-          </p:cNvPr>
-          <p:cNvSpPr/>
+            <a:ln>
+              <a:solidFill>
+                <a:srgbClr val="002060"/>
+              </a:solidFill>
+            </a:ln>
+          </p:spPr>
+          <p:style>
+            <a:lnRef idx="2">
+              <a:schemeClr val="accent1">
+                <a:shade val="15000"/>
+              </a:schemeClr>
+            </a:lnRef>
+            <a:fillRef idx="1">
+              <a:schemeClr val="accent1"/>
+            </a:fillRef>
+            <a:effectRef idx="0">
+              <a:schemeClr val="accent1"/>
+            </a:effectRef>
+            <a:fontRef idx="minor">
+              <a:schemeClr val="lt1"/>
+            </a:fontRef>
+          </p:style>
+          <p:txBody>
+            <a:bodyPr rtlCol="0" anchor="ctr"/>
+            <a:lstStyle/>
+            <a:p>
+              <a:pPr algn="ctr"/>
+              <a:endParaRPr lang="en-US" dirty="0"/>
+            </a:p>
+          </p:txBody>
+        </p:sp>
+        <p:sp>
+          <p:nvSpPr>
+            <p:cNvPr id="32" name="Arrow: Right 31">
+              <a:extLst>
+                <a:ext uri="{FF2B5EF4-FFF2-40B4-BE49-F238E27FC236}">
+                  <a16:creationId xmlns:a16="http://schemas.microsoft.com/office/drawing/2014/main" id="{2A293891-649B-D3A5-13BF-DC5A49D57273}"/>
+                </a:ext>
+              </a:extLst>
+            </p:cNvPr>
+            <p:cNvSpPr/>
+            <p:nvPr/>
+          </p:nvSpPr>
+          <p:spPr>
+            <a:xfrm rot="16200000">
+              <a:off x="8276787" y="4248187"/>
+              <a:ext cx="2920436" cy="212060"/>
+            </a:xfrm>
+            <a:prstGeom prst="rightArrow">
+              <a:avLst/>
+            </a:prstGeom>
+            <a:solidFill>
+              <a:srgbClr val="FF0000"/>
+            </a:solidFill>
+            <a:ln>
+              <a:solidFill>
+                <a:srgbClr val="C00000"/>
+              </a:solidFill>
+            </a:ln>
+          </p:spPr>
+          <p:style>
+            <a:lnRef idx="2">
+              <a:schemeClr val="accent1">
+                <a:shade val="15000"/>
+              </a:schemeClr>
+            </a:lnRef>
+            <a:fillRef idx="1">
+              <a:schemeClr val="accent1"/>
+            </a:fillRef>
+            <a:effectRef idx="0">
+              <a:schemeClr val="accent1"/>
+            </a:effectRef>
+            <a:fontRef idx="minor">
+              <a:schemeClr val="lt1"/>
+            </a:fontRef>
+          </p:style>
+          <p:txBody>
+            <a:bodyPr rtlCol="0" anchor="ctr"/>
+            <a:lstStyle/>
+            <a:p>
+              <a:pPr algn="ctr"/>
+              <a:endParaRPr lang="en-US" dirty="0"/>
+            </a:p>
+          </p:txBody>
+        </p:sp>
+      </p:grpSp>
+      <p:grpSp>
+        <p:nvGrpSpPr>
+          <p:cNvPr id="3" name="Group 2">
+            <a:extLst>
+              <a:ext uri="{FF2B5EF4-FFF2-40B4-BE49-F238E27FC236}">
+                <a16:creationId xmlns:a16="http://schemas.microsoft.com/office/drawing/2014/main" id="{50AF9F03-E3C0-1075-2479-2437ED53D1E3}"/>
+              </a:ext>
+            </a:extLst>
+          </p:cNvPr>
+          <p:cNvGrpSpPr/>
           <p:nvPr/>
-        </p:nvSpPr>
-        <p:spPr>
-          <a:xfrm rot="16200000">
-            <a:off x="8276787" y="4248187"/>
-            <a:ext cx="2920436" cy="212060"/>
-          </a:xfrm>
-          <a:prstGeom prst="rightArrow">
-            <a:avLst/>
-          </a:prstGeom>
-          <a:solidFill>
-            <a:srgbClr val="FF0000"/>
-          </a:solidFill>
-          <a:ln>
+        </p:nvGrpSpPr>
+        <p:grpSpPr>
+          <a:xfrm rot="10800000">
+            <a:off x="9343183" y="1194739"/>
+            <a:ext cx="499852" cy="500937"/>
+            <a:chOff x="9343183" y="1194739"/>
+            <a:chExt cx="499852" cy="500937"/>
+          </a:xfrm>
+        </p:grpSpPr>
+        <p:sp>
+          <p:nvSpPr>
+            <p:cNvPr id="33" name="Arrow: Right 32">
+              <a:extLst>
+                <a:ext uri="{FF2B5EF4-FFF2-40B4-BE49-F238E27FC236}">
+                  <a16:creationId xmlns:a16="http://schemas.microsoft.com/office/drawing/2014/main" id="{EF1361FC-0531-66CA-1DDE-EAAE9177ED60}"/>
+                </a:ext>
+              </a:extLst>
+            </p:cNvPr>
+            <p:cNvSpPr/>
+            <p:nvPr/>
+          </p:nvSpPr>
+          <p:spPr>
+            <a:xfrm rot="16200000">
+              <a:off x="9198744" y="1339178"/>
+              <a:ext cx="500937" cy="212060"/>
+            </a:xfrm>
+            <a:prstGeom prst="rightArrow">
+              <a:avLst/>
+            </a:prstGeom>
             <a:solidFill>
-              <a:srgbClr val="C00000"/>
+              <a:srgbClr val="0070C0"/>
             </a:solidFill>
-          </a:ln>
-        </p:spPr>
-        <p:style>
-          <a:lnRef idx="2">
-            <a:schemeClr val="accent1">
-              <a:shade val="15000"/>
-            </a:schemeClr>
-          </a:lnRef>
-          <a:fillRef idx="1">
-            <a:schemeClr val="accent1"/>
-          </a:fillRef>
-          <a:effectRef idx="0">
-            <a:schemeClr val="accent1"/>
-          </a:effectRef>
-          <a:fontRef idx="minor">
-            <a:schemeClr val="lt1"/>
-          </a:fontRef>
-        </p:style>
-        <p:txBody>
-          <a:bodyPr rtlCol="0" anchor="ctr"/>
-          <a:lstStyle/>
-          <a:p>
-            <a:pPr algn="ctr"/>
-            <a:endParaRPr lang="en-US" dirty="0"/>
-          </a:p>
-        </p:txBody>
-      </p:sp>
-      <p:sp>
-        <p:nvSpPr>
-          <p:cNvPr id="33" name="Arrow: Right 32">
-            <a:extLst>
-              <a:ext uri="{FF2B5EF4-FFF2-40B4-BE49-F238E27FC236}">
-                <a16:creationId xmlns:a16="http://schemas.microsoft.com/office/drawing/2014/main" id="{EF1361FC-0531-66CA-1DDE-EAAE9177ED60}"/>
-              </a:ext>
-            </a:extLst>
-          </p:cNvPr>
-          <p:cNvSpPr/>
-          <p:nvPr/>
-        </p:nvSpPr>
-        <p:spPr>
-          <a:xfrm rot="16200000">
-            <a:off x="9198744" y="1339178"/>
-            <a:ext cx="500937" cy="212060"/>
-          </a:xfrm>
-          <a:prstGeom prst="rightArrow">
-            <a:avLst/>
-          </a:prstGeom>
-          <a:solidFill>
-            <a:srgbClr val="0070C0"/>
-          </a:solidFill>
-          <a:ln>
+            <a:ln>
+              <a:solidFill>
+                <a:srgbClr val="002060"/>
+              </a:solidFill>
+            </a:ln>
+          </p:spPr>
+          <p:style>
+            <a:lnRef idx="2">
+              <a:schemeClr val="accent1">
+                <a:shade val="15000"/>
+              </a:schemeClr>
+            </a:lnRef>
+            <a:fillRef idx="1">
+              <a:schemeClr val="accent1"/>
+            </a:fillRef>
+            <a:effectRef idx="0">
+              <a:schemeClr val="accent1"/>
+            </a:effectRef>
+            <a:fontRef idx="minor">
+              <a:schemeClr val="lt1"/>
+            </a:fontRef>
+          </p:style>
+          <p:txBody>
+            <a:bodyPr rtlCol="0" anchor="ctr"/>
+            <a:lstStyle/>
+            <a:p>
+              <a:pPr algn="ctr"/>
+              <a:endParaRPr lang="en-US"/>
+            </a:p>
+          </p:txBody>
+        </p:sp>
+        <p:sp>
+          <p:nvSpPr>
+            <p:cNvPr id="34" name="Arrow: Right 33">
+              <a:extLst>
+                <a:ext uri="{FF2B5EF4-FFF2-40B4-BE49-F238E27FC236}">
+                  <a16:creationId xmlns:a16="http://schemas.microsoft.com/office/drawing/2014/main" id="{6504D514-9473-6031-1B9A-CE97CEA8C232}"/>
+                </a:ext>
+              </a:extLst>
+            </p:cNvPr>
+            <p:cNvSpPr/>
+            <p:nvPr/>
+          </p:nvSpPr>
+          <p:spPr>
+            <a:xfrm rot="16200000" flipH="1">
+              <a:off x="9486537" y="1339177"/>
+              <a:ext cx="500935" cy="212060"/>
+            </a:xfrm>
+            <a:prstGeom prst="rightArrow">
+              <a:avLst/>
+            </a:prstGeom>
             <a:solidFill>
-              <a:srgbClr val="002060"/>
+              <a:srgbClr val="FF0000"/>
             </a:solidFill>
-          </a:ln>
-        </p:spPr>
-        <p:style>
-          <a:lnRef idx="2">
-            <a:schemeClr val="accent1">
-              <a:shade val="15000"/>
-            </a:schemeClr>
-          </a:lnRef>
-          <a:fillRef idx="1">
-            <a:schemeClr val="accent1"/>
-          </a:fillRef>
-          <a:effectRef idx="0">
-            <a:schemeClr val="accent1"/>
-          </a:effectRef>
-          <a:fontRef idx="minor">
-            <a:schemeClr val="lt1"/>
-          </a:fontRef>
-        </p:style>
-        <p:txBody>
-          <a:bodyPr rtlCol="0" anchor="ctr"/>
-          <a:lstStyle/>
-          <a:p>
-            <a:pPr algn="ctr"/>
-            <a:endParaRPr lang="en-US"/>
-          </a:p>
-        </p:txBody>
-      </p:sp>
-      <p:sp>
-        <p:nvSpPr>
-          <p:cNvPr id="34" name="Arrow: Right 33">
-            <a:extLst>
-              <a:ext uri="{FF2B5EF4-FFF2-40B4-BE49-F238E27FC236}">
-                <a16:creationId xmlns:a16="http://schemas.microsoft.com/office/drawing/2014/main" id="{6504D514-9473-6031-1B9A-CE97CEA8C232}"/>
-              </a:ext>
-            </a:extLst>
-          </p:cNvPr>
-          <p:cNvSpPr/>
-          <p:nvPr/>
-        </p:nvSpPr>
-        <p:spPr>
-          <a:xfrm rot="16200000" flipH="1">
-            <a:off x="9486537" y="1339177"/>
-            <a:ext cx="500935" cy="212060"/>
-          </a:xfrm>
-          <a:prstGeom prst="rightArrow">
-            <a:avLst/>
-          </a:prstGeom>
-          <a:solidFill>
-            <a:srgbClr val="FF0000"/>
-          </a:solidFill>
-          <a:ln>
-            <a:solidFill>
-              <a:srgbClr val="C00000"/>
-            </a:solidFill>
-          </a:ln>
-        </p:spPr>
-        <p:style>
-          <a:lnRef idx="2">
-            <a:schemeClr val="accent1">
-              <a:shade val="15000"/>
-            </a:schemeClr>
-          </a:lnRef>
-          <a:fillRef idx="1">
-            <a:schemeClr val="accent1"/>
-          </a:fillRef>
-          <a:effectRef idx="0">
-            <a:schemeClr val="accent1"/>
-          </a:effectRef>
-          <a:fontRef idx="minor">
-            <a:schemeClr val="lt1"/>
-          </a:fontRef>
-        </p:style>
-        <p:txBody>
-          <a:bodyPr rtlCol="0" anchor="ctr"/>
-          <a:lstStyle/>
-          <a:p>
-            <a:pPr algn="ctr"/>
-            <a:endParaRPr lang="en-US"/>
-          </a:p>
-        </p:txBody>
-      </p:sp>
+            <a:ln>
+              <a:solidFill>
+                <a:srgbClr val="C00000"/>
+              </a:solidFill>
+            </a:ln>
+          </p:spPr>
+          <p:style>
+            <a:lnRef idx="2">
+              <a:schemeClr val="accent1">
+                <a:shade val="15000"/>
+              </a:schemeClr>
+            </a:lnRef>
+            <a:fillRef idx="1">
+              <a:schemeClr val="accent1"/>
+            </a:fillRef>
+            <a:effectRef idx="0">
+              <a:schemeClr val="accent1"/>
+            </a:effectRef>
+            <a:fontRef idx="minor">
+              <a:schemeClr val="lt1"/>
+            </a:fontRef>
+          </p:style>
+          <p:txBody>
+            <a:bodyPr rtlCol="0" anchor="ctr"/>
+            <a:lstStyle/>
+            <a:p>
+              <a:pPr algn="ctr"/>
+              <a:endParaRPr lang="en-US"/>
+            </a:p>
+          </p:txBody>
+        </p:sp>
+      </p:grpSp>
       <p:sp>
         <p:nvSpPr>
           <p:cNvPr id="35" name="TextBox 34">
@@ -9733,8 +9775,8 @@
           </a:p>
         </p:txBody>
       </p:sp>
-      <mc:AlternateContent xmlns:mc="http://schemas.openxmlformats.org/markup-compatibility/2006">
-        <mc:Choice xmlns:a14="http://schemas.microsoft.com/office/drawing/2010/main" Requires="a14">
+      <mc:AlternateContent xmlns:mc="http://schemas.openxmlformats.org/markup-compatibility/2006" xmlns:a14="http://schemas.microsoft.com/office/drawing/2010/main">
+        <mc:Choice Requires="a14">
           <p:sp>
             <p:nvSpPr>
               <p:cNvPr id="27" name="TextBox 26">
@@ -9838,7 +9880,7 @@
             </p:txBody>
           </p:sp>
         </mc:Choice>
-        <mc:Fallback>
+        <mc:Fallback xmlns="">
           <p:sp>
             <p:nvSpPr>
               <p:cNvPr id="27" name="TextBox 26">
@@ -9883,8 +9925,8 @@
           </p:sp>
         </mc:Fallback>
       </mc:AlternateContent>
-      <mc:AlternateContent xmlns:mc="http://schemas.openxmlformats.org/markup-compatibility/2006">
-        <mc:Choice xmlns:a14="http://schemas.microsoft.com/office/drawing/2010/main" Requires="a14">
+      <mc:AlternateContent xmlns:mc="http://schemas.openxmlformats.org/markup-compatibility/2006" xmlns:a14="http://schemas.microsoft.com/office/drawing/2010/main">
+        <mc:Choice Requires="a14">
           <p:sp>
             <p:nvSpPr>
               <p:cNvPr id="28" name="TextBox 27">
@@ -9913,6 +9955,7 @@
               </a:bodyPr>
               <a:lstStyle/>
               <a:p>
+                <a:pPr/>
                 <a14:m>
                   <m:oMathPara xmlns:m="http://schemas.openxmlformats.org/officeDocument/2006/math">
                     <m:oMathParaPr>
@@ -9964,7 +10007,7 @@
             </p:txBody>
           </p:sp>
         </mc:Choice>
-        <mc:Fallback>
+        <mc:Fallback xmlns="">
           <p:sp>
             <p:nvSpPr>
               <p:cNvPr id="28" name="TextBox 27">
@@ -10009,8 +10052,8 @@
           </p:sp>
         </mc:Fallback>
       </mc:AlternateContent>
-      <mc:AlternateContent xmlns:mc="http://schemas.openxmlformats.org/markup-compatibility/2006">
-        <mc:Choice xmlns:a14="http://schemas.microsoft.com/office/drawing/2010/main" Requires="a14">
+      <mc:AlternateContent xmlns:mc="http://schemas.openxmlformats.org/markup-compatibility/2006" xmlns:a14="http://schemas.microsoft.com/office/drawing/2010/main">
+        <mc:Choice Requires="a14">
           <p:sp>
             <p:nvSpPr>
               <p:cNvPr id="29" name="TextBox 28">
@@ -10039,6 +10082,7 @@
               </a:bodyPr>
               <a:lstStyle/>
               <a:p>
+                <a:pPr/>
                 <a14:m>
                   <m:oMathPara xmlns:m="http://schemas.openxmlformats.org/officeDocument/2006/math">
                     <m:oMathParaPr>
@@ -10084,7 +10128,7 @@
             </p:txBody>
           </p:sp>
         </mc:Choice>
-        <mc:Fallback>
+        <mc:Fallback xmlns="">
           <p:sp>
             <p:nvSpPr>
               <p:cNvPr id="29" name="TextBox 28">
@@ -10129,8 +10173,8 @@
           </p:sp>
         </mc:Fallback>
       </mc:AlternateContent>
-      <mc:AlternateContent xmlns:mc="http://schemas.openxmlformats.org/markup-compatibility/2006">
-        <mc:Choice xmlns:a14="http://schemas.microsoft.com/office/drawing/2010/main" Requires="a14">
+      <mc:AlternateContent xmlns:mc="http://schemas.openxmlformats.org/markup-compatibility/2006" xmlns:a14="http://schemas.microsoft.com/office/drawing/2010/main">
+        <mc:Choice Requires="a14">
           <p:sp>
             <p:nvSpPr>
               <p:cNvPr id="30" name="TextBox 29">
@@ -10159,6 +10203,7 @@
               </a:bodyPr>
               <a:lstStyle/>
               <a:p>
+                <a:pPr/>
                 <a14:m>
                   <m:oMathPara xmlns:m="http://schemas.openxmlformats.org/officeDocument/2006/math">
                     <m:oMathParaPr>
@@ -10204,7 +10249,7 @@
             </p:txBody>
           </p:sp>
         </mc:Choice>
-        <mc:Fallback>
+        <mc:Fallback xmlns="">
           <p:sp>
             <p:nvSpPr>
               <p:cNvPr id="30" name="TextBox 29">
@@ -10249,8 +10294,8 @@
           </p:sp>
         </mc:Fallback>
       </mc:AlternateContent>
-      <mc:AlternateContent xmlns:mc="http://schemas.openxmlformats.org/markup-compatibility/2006">
-        <mc:Choice xmlns:a14="http://schemas.microsoft.com/office/drawing/2010/main" Requires="a14">
+      <mc:AlternateContent xmlns:mc="http://schemas.openxmlformats.org/markup-compatibility/2006" xmlns:a14="http://schemas.microsoft.com/office/drawing/2010/main">
+        <mc:Choice Requires="a14">
           <p:sp>
             <p:nvSpPr>
               <p:cNvPr id="31" name="TextBox 30">
@@ -10279,6 +10324,7 @@
               </a:bodyPr>
               <a:lstStyle/>
               <a:p>
+                <a:pPr/>
                 <a14:m>
                   <m:oMathPara xmlns:m="http://schemas.openxmlformats.org/officeDocument/2006/math">
                     <m:oMathParaPr>
@@ -10361,7 +10407,7 @@
             </p:txBody>
           </p:sp>
         </mc:Choice>
-        <mc:Fallback>
+        <mc:Fallback xmlns="">
           <p:sp>
             <p:nvSpPr>
               <p:cNvPr id="31" name="TextBox 30">
@@ -10406,8 +10452,8 @@
           </p:sp>
         </mc:Fallback>
       </mc:AlternateContent>
-      <mc:AlternateContent xmlns:mc="http://schemas.openxmlformats.org/markup-compatibility/2006">
-        <mc:Choice xmlns:a14="http://schemas.microsoft.com/office/drawing/2010/main" Requires="a14">
+      <mc:AlternateContent xmlns:mc="http://schemas.openxmlformats.org/markup-compatibility/2006" xmlns:a14="http://schemas.microsoft.com/office/drawing/2010/main">
+        <mc:Choice Requires="a14">
           <p:sp>
             <p:nvSpPr>
               <p:cNvPr id="32" name="TextBox 31">
@@ -10436,6 +10482,7 @@
               </a:bodyPr>
               <a:lstStyle/>
               <a:p>
+                <a:pPr/>
                 <a14:m>
                   <m:oMathPara xmlns:m="http://schemas.openxmlformats.org/officeDocument/2006/math">
                     <m:oMathParaPr>
@@ -10530,7 +10577,7 @@
             </p:txBody>
           </p:sp>
         </mc:Choice>
-        <mc:Fallback>
+        <mc:Fallback xmlns="">
           <p:sp>
             <p:nvSpPr>
               <p:cNvPr id="32" name="TextBox 31">
@@ -10698,8 +10745,8 @@
           </a:p>
         </p:txBody>
       </p:sp>
-      <mc:AlternateContent xmlns:mc="http://schemas.openxmlformats.org/markup-compatibility/2006">
-        <mc:Choice xmlns:a14="http://schemas.microsoft.com/office/drawing/2010/main" Requires="a14">
+      <mc:AlternateContent xmlns:mc="http://schemas.openxmlformats.org/markup-compatibility/2006" xmlns:a14="http://schemas.microsoft.com/office/drawing/2010/main">
+        <mc:Choice Requires="a14">
           <p:sp>
             <p:nvSpPr>
               <p:cNvPr id="36" name="TextBox 35">
@@ -10808,7 +10855,7 @@
             </p:txBody>
           </p:sp>
         </mc:Choice>
-        <mc:Fallback>
+        <mc:Fallback xmlns="">
           <p:sp>
             <p:nvSpPr>
               <p:cNvPr id="36" name="TextBox 35">
@@ -10853,8 +10900,8 @@
           </p:sp>
         </mc:Fallback>
       </mc:AlternateContent>
-      <mc:AlternateContent xmlns:mc="http://schemas.openxmlformats.org/markup-compatibility/2006">
-        <mc:Choice xmlns:a14="http://schemas.microsoft.com/office/drawing/2010/main" Requires="a14">
+      <mc:AlternateContent xmlns:mc="http://schemas.openxmlformats.org/markup-compatibility/2006" xmlns:a14="http://schemas.microsoft.com/office/drawing/2010/main">
+        <mc:Choice Requires="a14">
           <p:sp>
             <p:nvSpPr>
               <p:cNvPr id="37" name="TextBox 36">
@@ -10963,7 +11010,7 @@
             </p:txBody>
           </p:sp>
         </mc:Choice>
-        <mc:Fallback>
+        <mc:Fallback xmlns="">
           <p:sp>
             <p:nvSpPr>
               <p:cNvPr id="37" name="TextBox 36">
@@ -11049,8 +11096,8 @@
           </a:p>
         </p:txBody>
       </p:sp>
-      <mc:AlternateContent xmlns:mc="http://schemas.openxmlformats.org/markup-compatibility/2006">
-        <mc:Choice xmlns:a14="http://schemas.microsoft.com/office/drawing/2010/main" Requires="a14">
+      <mc:AlternateContent xmlns:mc="http://schemas.openxmlformats.org/markup-compatibility/2006" xmlns:a14="http://schemas.microsoft.com/office/drawing/2010/main">
+        <mc:Choice Requires="a14">
           <p:sp>
             <p:nvSpPr>
               <p:cNvPr id="39" name="TextBox 38">
@@ -11079,6 +11126,7 @@
               </a:bodyPr>
               <a:lstStyle/>
               <a:p>
+                <a:pPr/>
                 <a14:m>
                   <m:oMathPara xmlns:m="http://schemas.openxmlformats.org/officeDocument/2006/math">
                     <m:oMathParaPr>
@@ -11168,7 +11216,7 @@
             </p:txBody>
           </p:sp>
         </mc:Choice>
-        <mc:Fallback>
+        <mc:Fallback xmlns="">
           <p:sp>
             <p:nvSpPr>
               <p:cNvPr id="39" name="TextBox 38">
@@ -11213,8 +11261,8 @@
           </p:sp>
         </mc:Fallback>
       </mc:AlternateContent>
-      <mc:AlternateContent xmlns:mc="http://schemas.openxmlformats.org/markup-compatibility/2006">
-        <mc:Choice xmlns:a14="http://schemas.microsoft.com/office/drawing/2010/main" Requires="a14">
+      <mc:AlternateContent xmlns:mc="http://schemas.openxmlformats.org/markup-compatibility/2006" xmlns:a14="http://schemas.microsoft.com/office/drawing/2010/main">
+        <mc:Choice Requires="a14">
           <p:sp>
             <p:nvSpPr>
               <p:cNvPr id="40" name="TextBox 39">
@@ -11243,6 +11291,7 @@
               </a:bodyPr>
               <a:lstStyle/>
               <a:p>
+                <a:pPr/>
                 <a14:m>
                   <m:oMathPara xmlns:m="http://schemas.openxmlformats.org/officeDocument/2006/math">
                     <m:oMathParaPr>
@@ -11332,7 +11381,7 @@
             </p:txBody>
           </p:sp>
         </mc:Choice>
-        <mc:Fallback>
+        <mc:Fallback xmlns="">
           <p:sp>
             <p:nvSpPr>
               <p:cNvPr id="40" name="TextBox 39">

</xml_diff>

<commit_message>
Added more details and organized slides
</commit_message>
<xml_diff>
--- a/z.ReadMeAssets/UTAH Github.pptx
+++ b/z.ReadMeAssets/UTAH Github.pptx
@@ -12,8 +12,8 @@
     <p:sldId id="257" r:id="rId3"/>
     <p:sldId id="259" r:id="rId4"/>
     <p:sldId id="261" r:id="rId5"/>
-    <p:sldId id="260" r:id="rId6"/>
-    <p:sldId id="258" r:id="rId7"/>
+    <p:sldId id="258" r:id="rId6"/>
+    <p:sldId id="260" r:id="rId7"/>
   </p:sldIdLst>
   <p:sldSz cx="12192000" cy="6858000"/>
   <p:notesSz cx="6858000" cy="9144000"/>
@@ -7935,1643 +7935,6 @@
 </file>
 
 <file path=ppt/slides/slide5.xml><?xml version="1.0" encoding="utf-8"?>
-<p:sld xmlns:a="http://schemas.openxmlformats.org/drawingml/2006/main" xmlns:r="http://schemas.openxmlformats.org/officeDocument/2006/relationships" xmlns:p="http://schemas.openxmlformats.org/presentationml/2006/main">
-  <p:cSld>
-    <p:spTree>
-      <p:nvGrpSpPr>
-        <p:cNvPr id="1" name=""/>
-        <p:cNvGrpSpPr/>
-        <p:nvPr/>
-      </p:nvGrpSpPr>
-      <p:grpSpPr>
-        <a:xfrm>
-          <a:off x="0" y="0"/>
-          <a:ext cx="0" cy="0"/>
-          <a:chOff x="0" y="0"/>
-          <a:chExt cx="0" cy="0"/>
-        </a:xfrm>
-      </p:grpSpPr>
-      <p:pic>
-        <p:nvPicPr>
-          <p:cNvPr id="16" name="Picture 15">
-            <a:extLst>
-              <a:ext uri="{FF2B5EF4-FFF2-40B4-BE49-F238E27FC236}">
-                <a16:creationId xmlns:a16="http://schemas.microsoft.com/office/drawing/2014/main" id="{742BF245-A9C2-7ACA-A244-57FACF33FEB8}"/>
-              </a:ext>
-            </a:extLst>
-          </p:cNvPr>
-          <p:cNvPicPr>
-            <a:picLocks noChangeAspect="1"/>
-          </p:cNvPicPr>
-          <p:nvPr/>
-        </p:nvPicPr>
-        <p:blipFill>
-          <a:blip r:embed="rId2"/>
-          <a:stretch>
-            <a:fillRect/>
-          </a:stretch>
-        </p:blipFill>
-        <p:spPr>
-          <a:xfrm>
-            <a:off x="306422" y="607829"/>
-            <a:ext cx="2950527" cy="3165466"/>
-          </a:xfrm>
-          <a:prstGeom prst="rect">
-            <a:avLst/>
-          </a:prstGeom>
-        </p:spPr>
-      </p:pic>
-      <p:sp>
-        <p:nvSpPr>
-          <p:cNvPr id="17" name="TextBox 16">
-            <a:extLst>
-              <a:ext uri="{FF2B5EF4-FFF2-40B4-BE49-F238E27FC236}">
-                <a16:creationId xmlns:a16="http://schemas.microsoft.com/office/drawing/2014/main" id="{DE62E486-AC37-0DD3-1F0C-71E71A21ED26}"/>
-              </a:ext>
-            </a:extLst>
-          </p:cNvPr>
-          <p:cNvSpPr txBox="1"/>
-          <p:nvPr/>
-        </p:nvSpPr>
-        <p:spPr>
-          <a:xfrm>
-            <a:off x="450484" y="185752"/>
-            <a:ext cx="1934070" cy="307777"/>
-          </a:xfrm>
-          <a:prstGeom prst="rect">
-            <a:avLst/>
-          </a:prstGeom>
-          <a:noFill/>
-          <a:ln>
-            <a:solidFill>
-              <a:schemeClr val="tx1"/>
-            </a:solidFill>
-          </a:ln>
-        </p:spPr>
-        <p:txBody>
-          <a:bodyPr wrap="square" rtlCol="0">
-            <a:spAutoFit/>
-          </a:bodyPr>
-          <a:lstStyle/>
-          <a:p>
-            <a:pPr algn="ctr"/>
-            <a:r>
-              <a:rPr lang="en-US" sz="1400" dirty="0"/>
-              <a:t>Excel Sheet Calculator</a:t>
-            </a:r>
-          </a:p>
-        </p:txBody>
-      </p:sp>
-      <p:sp>
-        <p:nvSpPr>
-          <p:cNvPr id="29" name="TextBox 28">
-            <a:extLst>
-              <a:ext uri="{FF2B5EF4-FFF2-40B4-BE49-F238E27FC236}">
-                <a16:creationId xmlns:a16="http://schemas.microsoft.com/office/drawing/2014/main" id="{AF369CF3-183C-AB36-4DEC-BBF741F95E2B}"/>
-              </a:ext>
-            </a:extLst>
-          </p:cNvPr>
-          <p:cNvSpPr txBox="1"/>
-          <p:nvPr/>
-        </p:nvSpPr>
-        <p:spPr>
-          <a:xfrm>
-            <a:off x="3672044" y="218962"/>
-            <a:ext cx="2349619" cy="307777"/>
-          </a:xfrm>
-          <a:prstGeom prst="rect">
-            <a:avLst/>
-          </a:prstGeom>
-          <a:noFill/>
-          <a:ln>
-            <a:solidFill>
-              <a:schemeClr val="tx1"/>
-            </a:solidFill>
-          </a:ln>
-        </p:spPr>
-        <p:txBody>
-          <a:bodyPr wrap="square" rtlCol="0">
-            <a:spAutoFit/>
-          </a:bodyPr>
-          <a:lstStyle/>
-          <a:p>
-            <a:pPr algn="ctr"/>
-            <a:r>
-              <a:rPr lang="en-US" sz="1400" dirty="0"/>
-              <a:t>COMSOL Simulation</a:t>
-            </a:r>
-          </a:p>
-        </p:txBody>
-      </p:sp>
-      <p:pic>
-        <p:nvPicPr>
-          <p:cNvPr id="30" name="Picture 29">
-            <a:extLst>
-              <a:ext uri="{FF2B5EF4-FFF2-40B4-BE49-F238E27FC236}">
-                <a16:creationId xmlns:a16="http://schemas.microsoft.com/office/drawing/2014/main" id="{B147F649-6C33-C877-4513-CE7BE3D549CB}"/>
-              </a:ext>
-            </a:extLst>
-          </p:cNvPr>
-          <p:cNvPicPr>
-            <a:picLocks noChangeAspect="1"/>
-          </p:cNvPicPr>
-          <p:nvPr/>
-        </p:nvPicPr>
-        <p:blipFill>
-          <a:blip r:embed="rId3"/>
-          <a:srcRect l="8275" t="10957" r="6047" b="6925"/>
-          <a:stretch/>
-        </p:blipFill>
-        <p:spPr>
-          <a:xfrm rot="16200000">
-            <a:off x="6698003" y="1985444"/>
-            <a:ext cx="5758979" cy="3082515"/>
-          </a:xfrm>
-          <a:prstGeom prst="rect">
-            <a:avLst/>
-          </a:prstGeom>
-        </p:spPr>
-      </p:pic>
-      <p:grpSp>
-        <p:nvGrpSpPr>
-          <p:cNvPr id="2" name="Group 1">
-            <a:extLst>
-              <a:ext uri="{FF2B5EF4-FFF2-40B4-BE49-F238E27FC236}">
-                <a16:creationId xmlns:a16="http://schemas.microsoft.com/office/drawing/2014/main" id="{CCEFCCF8-6063-2809-5FAA-6E7A7AF1DFF9}"/>
-              </a:ext>
-            </a:extLst>
-          </p:cNvPr>
-          <p:cNvGrpSpPr/>
-          <p:nvPr/>
-        </p:nvGrpSpPr>
-        <p:grpSpPr>
-          <a:xfrm rot="10800000">
-            <a:off x="9343183" y="2893999"/>
-            <a:ext cx="499852" cy="2920436"/>
-            <a:chOff x="9343183" y="2893999"/>
-            <a:chExt cx="499852" cy="2920436"/>
-          </a:xfrm>
-        </p:grpSpPr>
-        <p:sp>
-          <p:nvSpPr>
-            <p:cNvPr id="31" name="Arrow: Right 30">
-              <a:extLst>
-                <a:ext uri="{FF2B5EF4-FFF2-40B4-BE49-F238E27FC236}">
-                  <a16:creationId xmlns:a16="http://schemas.microsoft.com/office/drawing/2014/main" id="{EA56CE58-C3C1-15A7-12B9-A2A007E84C38}"/>
-                </a:ext>
-              </a:extLst>
-            </p:cNvPr>
-            <p:cNvSpPr/>
-            <p:nvPr/>
-          </p:nvSpPr>
-          <p:spPr>
-            <a:xfrm rot="5400000">
-              <a:off x="7988997" y="4248185"/>
-              <a:ext cx="2920434" cy="212062"/>
-            </a:xfrm>
-            <a:prstGeom prst="rightArrow">
-              <a:avLst/>
-            </a:prstGeom>
-            <a:solidFill>
-              <a:srgbClr val="0070C0"/>
-            </a:solidFill>
-            <a:ln>
-              <a:solidFill>
-                <a:srgbClr val="002060"/>
-              </a:solidFill>
-            </a:ln>
-          </p:spPr>
-          <p:style>
-            <a:lnRef idx="2">
-              <a:schemeClr val="accent1">
-                <a:shade val="15000"/>
-              </a:schemeClr>
-            </a:lnRef>
-            <a:fillRef idx="1">
-              <a:schemeClr val="accent1"/>
-            </a:fillRef>
-            <a:effectRef idx="0">
-              <a:schemeClr val="accent1"/>
-            </a:effectRef>
-            <a:fontRef idx="minor">
-              <a:schemeClr val="lt1"/>
-            </a:fontRef>
-          </p:style>
-          <p:txBody>
-            <a:bodyPr rtlCol="0" anchor="ctr"/>
-            <a:lstStyle/>
-            <a:p>
-              <a:pPr algn="ctr"/>
-              <a:endParaRPr lang="en-US" dirty="0"/>
-            </a:p>
-          </p:txBody>
-        </p:sp>
-        <p:sp>
-          <p:nvSpPr>
-            <p:cNvPr id="32" name="Arrow: Right 31">
-              <a:extLst>
-                <a:ext uri="{FF2B5EF4-FFF2-40B4-BE49-F238E27FC236}">
-                  <a16:creationId xmlns:a16="http://schemas.microsoft.com/office/drawing/2014/main" id="{2A293891-649B-D3A5-13BF-DC5A49D57273}"/>
-                </a:ext>
-              </a:extLst>
-            </p:cNvPr>
-            <p:cNvSpPr/>
-            <p:nvPr/>
-          </p:nvSpPr>
-          <p:spPr>
-            <a:xfrm rot="16200000">
-              <a:off x="8276787" y="4248187"/>
-              <a:ext cx="2920436" cy="212060"/>
-            </a:xfrm>
-            <a:prstGeom prst="rightArrow">
-              <a:avLst/>
-            </a:prstGeom>
-            <a:solidFill>
-              <a:srgbClr val="FF0000"/>
-            </a:solidFill>
-            <a:ln>
-              <a:solidFill>
-                <a:srgbClr val="C00000"/>
-              </a:solidFill>
-            </a:ln>
-          </p:spPr>
-          <p:style>
-            <a:lnRef idx="2">
-              <a:schemeClr val="accent1">
-                <a:shade val="15000"/>
-              </a:schemeClr>
-            </a:lnRef>
-            <a:fillRef idx="1">
-              <a:schemeClr val="accent1"/>
-            </a:fillRef>
-            <a:effectRef idx="0">
-              <a:schemeClr val="accent1"/>
-            </a:effectRef>
-            <a:fontRef idx="minor">
-              <a:schemeClr val="lt1"/>
-            </a:fontRef>
-          </p:style>
-          <p:txBody>
-            <a:bodyPr rtlCol="0" anchor="ctr"/>
-            <a:lstStyle/>
-            <a:p>
-              <a:pPr algn="ctr"/>
-              <a:endParaRPr lang="en-US" dirty="0"/>
-            </a:p>
-          </p:txBody>
-        </p:sp>
-      </p:grpSp>
-      <p:grpSp>
-        <p:nvGrpSpPr>
-          <p:cNvPr id="3" name="Group 2">
-            <a:extLst>
-              <a:ext uri="{FF2B5EF4-FFF2-40B4-BE49-F238E27FC236}">
-                <a16:creationId xmlns:a16="http://schemas.microsoft.com/office/drawing/2014/main" id="{50AF9F03-E3C0-1075-2479-2437ED53D1E3}"/>
-              </a:ext>
-            </a:extLst>
-          </p:cNvPr>
-          <p:cNvGrpSpPr/>
-          <p:nvPr/>
-        </p:nvGrpSpPr>
-        <p:grpSpPr>
-          <a:xfrm rot="10800000">
-            <a:off x="9343183" y="1194739"/>
-            <a:ext cx="499852" cy="500937"/>
-            <a:chOff x="9343183" y="1194739"/>
-            <a:chExt cx="499852" cy="500937"/>
-          </a:xfrm>
-        </p:grpSpPr>
-        <p:sp>
-          <p:nvSpPr>
-            <p:cNvPr id="33" name="Arrow: Right 32">
-              <a:extLst>
-                <a:ext uri="{FF2B5EF4-FFF2-40B4-BE49-F238E27FC236}">
-                  <a16:creationId xmlns:a16="http://schemas.microsoft.com/office/drawing/2014/main" id="{EF1361FC-0531-66CA-1DDE-EAAE9177ED60}"/>
-                </a:ext>
-              </a:extLst>
-            </p:cNvPr>
-            <p:cNvSpPr/>
-            <p:nvPr/>
-          </p:nvSpPr>
-          <p:spPr>
-            <a:xfrm rot="16200000">
-              <a:off x="9198744" y="1339178"/>
-              <a:ext cx="500937" cy="212060"/>
-            </a:xfrm>
-            <a:prstGeom prst="rightArrow">
-              <a:avLst/>
-            </a:prstGeom>
-            <a:solidFill>
-              <a:srgbClr val="0070C0"/>
-            </a:solidFill>
-            <a:ln>
-              <a:solidFill>
-                <a:srgbClr val="002060"/>
-              </a:solidFill>
-            </a:ln>
-          </p:spPr>
-          <p:style>
-            <a:lnRef idx="2">
-              <a:schemeClr val="accent1">
-                <a:shade val="15000"/>
-              </a:schemeClr>
-            </a:lnRef>
-            <a:fillRef idx="1">
-              <a:schemeClr val="accent1"/>
-            </a:fillRef>
-            <a:effectRef idx="0">
-              <a:schemeClr val="accent1"/>
-            </a:effectRef>
-            <a:fontRef idx="minor">
-              <a:schemeClr val="lt1"/>
-            </a:fontRef>
-          </p:style>
-          <p:txBody>
-            <a:bodyPr rtlCol="0" anchor="ctr"/>
-            <a:lstStyle/>
-            <a:p>
-              <a:pPr algn="ctr"/>
-              <a:endParaRPr lang="en-US"/>
-            </a:p>
-          </p:txBody>
-        </p:sp>
-        <p:sp>
-          <p:nvSpPr>
-            <p:cNvPr id="34" name="Arrow: Right 33">
-              <a:extLst>
-                <a:ext uri="{FF2B5EF4-FFF2-40B4-BE49-F238E27FC236}">
-                  <a16:creationId xmlns:a16="http://schemas.microsoft.com/office/drawing/2014/main" id="{6504D514-9473-6031-1B9A-CE97CEA8C232}"/>
-                </a:ext>
-              </a:extLst>
-            </p:cNvPr>
-            <p:cNvSpPr/>
-            <p:nvPr/>
-          </p:nvSpPr>
-          <p:spPr>
-            <a:xfrm rot="16200000" flipH="1">
-              <a:off x="9486537" y="1339177"/>
-              <a:ext cx="500935" cy="212060"/>
-            </a:xfrm>
-            <a:prstGeom prst="rightArrow">
-              <a:avLst/>
-            </a:prstGeom>
-            <a:solidFill>
-              <a:srgbClr val="FF0000"/>
-            </a:solidFill>
-            <a:ln>
-              <a:solidFill>
-                <a:srgbClr val="C00000"/>
-              </a:solidFill>
-            </a:ln>
-          </p:spPr>
-          <p:style>
-            <a:lnRef idx="2">
-              <a:schemeClr val="accent1">
-                <a:shade val="15000"/>
-              </a:schemeClr>
-            </a:lnRef>
-            <a:fillRef idx="1">
-              <a:schemeClr val="accent1"/>
-            </a:fillRef>
-            <a:effectRef idx="0">
-              <a:schemeClr val="accent1"/>
-            </a:effectRef>
-            <a:fontRef idx="minor">
-              <a:schemeClr val="lt1"/>
-            </a:fontRef>
-          </p:style>
-          <p:txBody>
-            <a:bodyPr rtlCol="0" anchor="ctr"/>
-            <a:lstStyle/>
-            <a:p>
-              <a:pPr algn="ctr"/>
-              <a:endParaRPr lang="en-US"/>
-            </a:p>
-          </p:txBody>
-        </p:sp>
-      </p:grpSp>
-      <p:sp>
-        <p:nvSpPr>
-          <p:cNvPr id="35" name="TextBox 34">
-            <a:extLst>
-              <a:ext uri="{FF2B5EF4-FFF2-40B4-BE49-F238E27FC236}">
-                <a16:creationId xmlns:a16="http://schemas.microsoft.com/office/drawing/2014/main" id="{FC29E358-76A0-7B0A-3725-0122CDBF18FB}"/>
-              </a:ext>
-            </a:extLst>
-          </p:cNvPr>
-          <p:cNvSpPr txBox="1"/>
-          <p:nvPr/>
-        </p:nvSpPr>
-        <p:spPr>
-          <a:xfrm>
-            <a:off x="8155785" y="232184"/>
-            <a:ext cx="2950378" cy="307777"/>
-          </a:xfrm>
-          <a:prstGeom prst="rect">
-            <a:avLst/>
-          </a:prstGeom>
-          <a:noFill/>
-          <a:ln>
-            <a:solidFill>
-              <a:schemeClr val="tx1"/>
-            </a:solidFill>
-          </a:ln>
-        </p:spPr>
-        <p:txBody>
-          <a:bodyPr wrap="square" rtlCol="0">
-            <a:spAutoFit/>
-          </a:bodyPr>
-          <a:lstStyle/>
-          <a:p>
-            <a:pPr algn="ctr"/>
-            <a:r>
-              <a:rPr lang="en-US" sz="1400" dirty="0"/>
-              <a:t>Expected Drift based on Simulation</a:t>
-            </a:r>
-          </a:p>
-        </p:txBody>
-      </p:sp>
-      <p:cxnSp>
-        <p:nvCxnSpPr>
-          <p:cNvPr id="36" name="Straight Connector 35">
-            <a:extLst>
-              <a:ext uri="{FF2B5EF4-FFF2-40B4-BE49-F238E27FC236}">
-                <a16:creationId xmlns:a16="http://schemas.microsoft.com/office/drawing/2014/main" id="{0A3B2172-8E51-42BE-1B79-2DECC7A194D8}"/>
-              </a:ext>
-            </a:extLst>
-          </p:cNvPr>
-          <p:cNvCxnSpPr>
-            <a:cxnSpLocks/>
-          </p:cNvCxnSpPr>
-          <p:nvPr/>
-        </p:nvCxnSpPr>
-        <p:spPr>
-          <a:xfrm>
-            <a:off x="7885228" y="1006665"/>
-            <a:ext cx="0" cy="4456382"/>
-          </a:xfrm>
-          <a:prstGeom prst="line">
-            <a:avLst/>
-          </a:prstGeom>
-          <a:ln w="38100"/>
-        </p:spPr>
-        <p:style>
-          <a:lnRef idx="2">
-            <a:schemeClr val="accent1"/>
-          </a:lnRef>
-          <a:fillRef idx="0">
-            <a:schemeClr val="accent1"/>
-          </a:fillRef>
-          <a:effectRef idx="1">
-            <a:schemeClr val="accent1"/>
-          </a:effectRef>
-          <a:fontRef idx="minor">
-            <a:schemeClr val="tx1"/>
-          </a:fontRef>
-        </p:style>
-      </p:cxnSp>
-      <p:cxnSp>
-        <p:nvCxnSpPr>
-          <p:cNvPr id="37" name="Straight Connector 36">
-            <a:extLst>
-              <a:ext uri="{FF2B5EF4-FFF2-40B4-BE49-F238E27FC236}">
-                <a16:creationId xmlns:a16="http://schemas.microsoft.com/office/drawing/2014/main" id="{B1600E67-5E8D-1311-B769-53BB98A0810E}"/>
-              </a:ext>
-            </a:extLst>
-          </p:cNvPr>
-          <p:cNvCxnSpPr>
-            <a:cxnSpLocks/>
-          </p:cNvCxnSpPr>
-          <p:nvPr/>
-        </p:nvCxnSpPr>
-        <p:spPr>
-          <a:xfrm>
-            <a:off x="3352800" y="1068118"/>
-            <a:ext cx="0" cy="4456382"/>
-          </a:xfrm>
-          <a:prstGeom prst="line">
-            <a:avLst/>
-          </a:prstGeom>
-          <a:ln w="38100"/>
-        </p:spPr>
-        <p:style>
-          <a:lnRef idx="2">
-            <a:schemeClr val="accent1"/>
-          </a:lnRef>
-          <a:fillRef idx="0">
-            <a:schemeClr val="accent1"/>
-          </a:fillRef>
-          <a:effectRef idx="1">
-            <a:schemeClr val="accent1"/>
-          </a:effectRef>
-          <a:fontRef idx="minor">
-            <a:schemeClr val="tx1"/>
-          </a:fontRef>
-        </p:style>
-      </p:cxnSp>
-      <p:sp>
-        <p:nvSpPr>
-          <p:cNvPr id="38" name="TextBox 37">
-            <a:extLst>
-              <a:ext uri="{FF2B5EF4-FFF2-40B4-BE49-F238E27FC236}">
-                <a16:creationId xmlns:a16="http://schemas.microsoft.com/office/drawing/2014/main" id="{C4A7165B-1185-A9DF-7CED-90BBB71B7697}"/>
-              </a:ext>
-            </a:extLst>
-          </p:cNvPr>
-          <p:cNvSpPr txBox="1"/>
-          <p:nvPr/>
-        </p:nvSpPr>
-        <p:spPr>
-          <a:xfrm>
-            <a:off x="450484" y="3927183"/>
-            <a:ext cx="2600379" cy="954107"/>
-          </a:xfrm>
-          <a:prstGeom prst="rect">
-            <a:avLst/>
-          </a:prstGeom>
-          <a:noFill/>
-          <a:ln>
-            <a:noFill/>
-          </a:ln>
-        </p:spPr>
-        <p:txBody>
-          <a:bodyPr wrap="square" rtlCol="0">
-            <a:spAutoFit/>
-          </a:bodyPr>
-          <a:lstStyle/>
-          <a:p>
-            <a:pPr algn="ctr"/>
-            <a:r>
-              <a:rPr lang="en-US" sz="1400" dirty="0"/>
-              <a:t>Changing the green box in the excel sheet will update all values. All other values are constant or set.</a:t>
-            </a:r>
-          </a:p>
-        </p:txBody>
-      </p:sp>
-      <p:pic>
-        <p:nvPicPr>
-          <p:cNvPr id="40" name="Picture 39">
-            <a:extLst>
-              <a:ext uri="{FF2B5EF4-FFF2-40B4-BE49-F238E27FC236}">
-                <a16:creationId xmlns:a16="http://schemas.microsoft.com/office/drawing/2014/main" id="{20EA7C80-3D69-8F3A-361C-FCAF39ABC22E}"/>
-              </a:ext>
-            </a:extLst>
-          </p:cNvPr>
-          <p:cNvPicPr>
-            <a:picLocks noChangeAspect="1"/>
-          </p:cNvPicPr>
-          <p:nvPr/>
-        </p:nvPicPr>
-        <p:blipFill>
-          <a:blip r:embed="rId4"/>
-          <a:srcRect l="27130" r="24742"/>
-          <a:stretch/>
-        </p:blipFill>
-        <p:spPr>
-          <a:xfrm rot="10800000">
-            <a:off x="3509955" y="621696"/>
-            <a:ext cx="3600728" cy="5813882"/>
-          </a:xfrm>
-          <a:prstGeom prst="rect">
-            <a:avLst/>
-          </a:prstGeom>
-        </p:spPr>
-      </p:pic>
-      <p:pic>
-        <p:nvPicPr>
-          <p:cNvPr id="41" name="Picture 40">
-            <a:extLst>
-              <a:ext uri="{FF2B5EF4-FFF2-40B4-BE49-F238E27FC236}">
-                <a16:creationId xmlns:a16="http://schemas.microsoft.com/office/drawing/2014/main" id="{56B2D32E-A669-911A-6099-4BB5BF26865C}"/>
-              </a:ext>
-            </a:extLst>
-          </p:cNvPr>
-          <p:cNvPicPr>
-            <a:picLocks noChangeAspect="1"/>
-          </p:cNvPicPr>
-          <p:nvPr/>
-        </p:nvPicPr>
-        <p:blipFill>
-          <a:blip r:embed="rId4"/>
-          <a:srcRect l="91123" t="2678" r="529" b="1417"/>
-          <a:stretch/>
-        </p:blipFill>
-        <p:spPr>
-          <a:xfrm>
-            <a:off x="7127102" y="493529"/>
-            <a:ext cx="669210" cy="5974968"/>
-          </a:xfrm>
-          <a:prstGeom prst="rect">
-            <a:avLst/>
-          </a:prstGeom>
-        </p:spPr>
-      </p:pic>
-      <p:sp>
-        <p:nvSpPr>
-          <p:cNvPr id="42" name="Rectangle: Rounded Corners 41">
-            <a:extLst>
-              <a:ext uri="{FF2B5EF4-FFF2-40B4-BE49-F238E27FC236}">
-                <a16:creationId xmlns:a16="http://schemas.microsoft.com/office/drawing/2014/main" id="{797FE3FD-D1E4-3D41-FA08-7F46FF6362E4}"/>
-              </a:ext>
-            </a:extLst>
-          </p:cNvPr>
-          <p:cNvSpPr/>
-          <p:nvPr/>
-        </p:nvSpPr>
-        <p:spPr>
-          <a:xfrm>
-            <a:off x="11003669" y="689122"/>
-            <a:ext cx="779668" cy="210038"/>
-          </a:xfrm>
-          <a:prstGeom prst="roundRect">
-            <a:avLst/>
-          </a:prstGeom>
-          <a:noFill/>
-          <a:ln>
-            <a:solidFill>
-              <a:schemeClr val="accent2">
-                <a:lumMod val="60000"/>
-                <a:lumOff val="40000"/>
-              </a:schemeClr>
-            </a:solidFill>
-          </a:ln>
-        </p:spPr>
-        <p:style>
-          <a:lnRef idx="2">
-            <a:schemeClr val="accent1">
-              <a:shade val="15000"/>
-            </a:schemeClr>
-          </a:lnRef>
-          <a:fillRef idx="1">
-            <a:schemeClr val="accent1"/>
-          </a:fillRef>
-          <a:effectRef idx="0">
-            <a:schemeClr val="accent1"/>
-          </a:effectRef>
-          <a:fontRef idx="minor">
-            <a:schemeClr val="lt1"/>
-          </a:fontRef>
-        </p:style>
-        <p:txBody>
-          <a:bodyPr rtlCol="0" anchor="ctr"/>
-          <a:lstStyle/>
-          <a:p>
-            <a:pPr algn="ctr"/>
-            <a:r>
-              <a:rPr lang="en-US" b="1" dirty="0">
-                <a:solidFill>
-                  <a:schemeClr val="tx1"/>
-                </a:solidFill>
-              </a:rPr>
-              <a:t>B4</a:t>
-            </a:r>
-          </a:p>
-        </p:txBody>
-      </p:sp>
-      <p:sp>
-        <p:nvSpPr>
-          <p:cNvPr id="43" name="Rectangle: Rounded Corners 42">
-            <a:extLst>
-              <a:ext uri="{FF2B5EF4-FFF2-40B4-BE49-F238E27FC236}">
-                <a16:creationId xmlns:a16="http://schemas.microsoft.com/office/drawing/2014/main" id="{4602054D-4BAC-104B-9BAD-15E8D684A81B}"/>
-              </a:ext>
-            </a:extLst>
-          </p:cNvPr>
-          <p:cNvSpPr/>
-          <p:nvPr/>
-        </p:nvSpPr>
-        <p:spPr>
-          <a:xfrm>
-            <a:off x="11003669" y="1041547"/>
-            <a:ext cx="779668" cy="210038"/>
-          </a:xfrm>
-          <a:prstGeom prst="roundRect">
-            <a:avLst/>
-          </a:prstGeom>
-          <a:noFill/>
-          <a:ln>
-            <a:solidFill>
-              <a:schemeClr val="accent2">
-                <a:lumMod val="60000"/>
-                <a:lumOff val="40000"/>
-              </a:schemeClr>
-            </a:solidFill>
-          </a:ln>
-        </p:spPr>
-        <p:style>
-          <a:lnRef idx="2">
-            <a:schemeClr val="accent1">
-              <a:shade val="15000"/>
-            </a:schemeClr>
-          </a:lnRef>
-          <a:fillRef idx="1">
-            <a:schemeClr val="accent1"/>
-          </a:fillRef>
-          <a:effectRef idx="0">
-            <a:schemeClr val="accent1"/>
-          </a:effectRef>
-          <a:fontRef idx="minor">
-            <a:schemeClr val="lt1"/>
-          </a:fontRef>
-        </p:style>
-        <p:txBody>
-          <a:bodyPr rtlCol="0" anchor="ctr"/>
-          <a:lstStyle/>
-          <a:p>
-            <a:pPr algn="ctr"/>
-            <a:r>
-              <a:rPr lang="en-US" b="1" dirty="0">
-                <a:solidFill>
-                  <a:schemeClr val="tx1"/>
-                </a:solidFill>
-              </a:rPr>
-              <a:t>B3</a:t>
-            </a:r>
-          </a:p>
-        </p:txBody>
-      </p:sp>
-      <p:sp>
-        <p:nvSpPr>
-          <p:cNvPr id="44" name="Rectangle: Rounded Corners 43">
-            <a:extLst>
-              <a:ext uri="{FF2B5EF4-FFF2-40B4-BE49-F238E27FC236}">
-                <a16:creationId xmlns:a16="http://schemas.microsoft.com/office/drawing/2014/main" id="{ECE62C2A-D7DE-8A3B-77CA-9E4A54A8849D}"/>
-              </a:ext>
-            </a:extLst>
-          </p:cNvPr>
-          <p:cNvSpPr/>
-          <p:nvPr/>
-        </p:nvSpPr>
-        <p:spPr>
-          <a:xfrm>
-            <a:off x="11003669" y="1393972"/>
-            <a:ext cx="779668" cy="210038"/>
-          </a:xfrm>
-          <a:prstGeom prst="roundRect">
-            <a:avLst/>
-          </a:prstGeom>
-          <a:noFill/>
-          <a:ln>
-            <a:solidFill>
-              <a:schemeClr val="accent2">
-                <a:lumMod val="60000"/>
-                <a:lumOff val="40000"/>
-              </a:schemeClr>
-            </a:solidFill>
-          </a:ln>
-        </p:spPr>
-        <p:style>
-          <a:lnRef idx="2">
-            <a:schemeClr val="accent1">
-              <a:shade val="15000"/>
-            </a:schemeClr>
-          </a:lnRef>
-          <a:fillRef idx="1">
-            <a:schemeClr val="accent1"/>
-          </a:fillRef>
-          <a:effectRef idx="0">
-            <a:schemeClr val="accent1"/>
-          </a:effectRef>
-          <a:fontRef idx="minor">
-            <a:schemeClr val="lt1"/>
-          </a:fontRef>
-        </p:style>
-        <p:txBody>
-          <a:bodyPr rtlCol="0" anchor="ctr"/>
-          <a:lstStyle/>
-          <a:p>
-            <a:pPr algn="ctr"/>
-            <a:r>
-              <a:rPr lang="en-US" b="1" dirty="0">
-                <a:solidFill>
-                  <a:schemeClr val="tx1"/>
-                </a:solidFill>
-              </a:rPr>
-              <a:t>B2</a:t>
-            </a:r>
-          </a:p>
-        </p:txBody>
-      </p:sp>
-      <p:sp>
-        <p:nvSpPr>
-          <p:cNvPr id="45" name="Rectangle: Rounded Corners 44">
-            <a:extLst>
-              <a:ext uri="{FF2B5EF4-FFF2-40B4-BE49-F238E27FC236}">
-                <a16:creationId xmlns:a16="http://schemas.microsoft.com/office/drawing/2014/main" id="{E3D02DE5-3A38-3F8C-9AB9-DE8B9D926FE5}"/>
-              </a:ext>
-            </a:extLst>
-          </p:cNvPr>
-          <p:cNvSpPr/>
-          <p:nvPr/>
-        </p:nvSpPr>
-        <p:spPr>
-          <a:xfrm>
-            <a:off x="11003669" y="1746397"/>
-            <a:ext cx="779668" cy="210038"/>
-          </a:xfrm>
-          <a:prstGeom prst="roundRect">
-            <a:avLst/>
-          </a:prstGeom>
-          <a:noFill/>
-          <a:ln>
-            <a:solidFill>
-              <a:schemeClr val="accent2">
-                <a:lumMod val="60000"/>
-                <a:lumOff val="40000"/>
-              </a:schemeClr>
-            </a:solidFill>
-          </a:ln>
-        </p:spPr>
-        <p:style>
-          <a:lnRef idx="2">
-            <a:schemeClr val="accent1">
-              <a:shade val="15000"/>
-            </a:schemeClr>
-          </a:lnRef>
-          <a:fillRef idx="1">
-            <a:schemeClr val="accent1"/>
-          </a:fillRef>
-          <a:effectRef idx="0">
-            <a:schemeClr val="accent1"/>
-          </a:effectRef>
-          <a:fontRef idx="minor">
-            <a:schemeClr val="lt1"/>
-          </a:fontRef>
-        </p:style>
-        <p:txBody>
-          <a:bodyPr rtlCol="0" anchor="ctr"/>
-          <a:lstStyle/>
-          <a:p>
-            <a:pPr algn="ctr"/>
-            <a:r>
-              <a:rPr lang="en-US" b="1" dirty="0">
-                <a:solidFill>
-                  <a:schemeClr val="tx1"/>
-                </a:solidFill>
-              </a:rPr>
-              <a:t>B1</a:t>
-            </a:r>
-          </a:p>
-        </p:txBody>
-      </p:sp>
-      <p:sp>
-        <p:nvSpPr>
-          <p:cNvPr id="46" name="Rectangle: Rounded Corners 45">
-            <a:extLst>
-              <a:ext uri="{FF2B5EF4-FFF2-40B4-BE49-F238E27FC236}">
-                <a16:creationId xmlns:a16="http://schemas.microsoft.com/office/drawing/2014/main" id="{3ABBCC71-2678-140D-ACB8-FCD2B7A68789}"/>
-              </a:ext>
-            </a:extLst>
-          </p:cNvPr>
-          <p:cNvSpPr/>
-          <p:nvPr/>
-        </p:nvSpPr>
-        <p:spPr>
-          <a:xfrm>
-            <a:off x="11003669" y="2072562"/>
-            <a:ext cx="779668" cy="210038"/>
-          </a:xfrm>
-          <a:prstGeom prst="roundRect">
-            <a:avLst/>
-          </a:prstGeom>
-          <a:noFill/>
-          <a:ln>
-            <a:solidFill>
-              <a:schemeClr val="accent2">
-                <a:lumMod val="60000"/>
-                <a:lumOff val="40000"/>
-              </a:schemeClr>
-            </a:solidFill>
-          </a:ln>
-        </p:spPr>
-        <p:style>
-          <a:lnRef idx="2">
-            <a:schemeClr val="accent1">
-              <a:shade val="15000"/>
-            </a:schemeClr>
-          </a:lnRef>
-          <a:fillRef idx="1">
-            <a:schemeClr val="accent1"/>
-          </a:fillRef>
-          <a:effectRef idx="0">
-            <a:schemeClr val="accent1"/>
-          </a:effectRef>
-          <a:fontRef idx="minor">
-            <a:schemeClr val="lt1"/>
-          </a:fontRef>
-        </p:style>
-        <p:txBody>
-          <a:bodyPr rtlCol="0" anchor="ctr"/>
-          <a:lstStyle/>
-          <a:p>
-            <a:pPr algn="ctr"/>
-            <a:r>
-              <a:rPr lang="en-US" b="1" dirty="0">
-                <a:solidFill>
-                  <a:schemeClr val="tx1"/>
-                </a:solidFill>
-              </a:rPr>
-              <a:t>HV</a:t>
-            </a:r>
-          </a:p>
-        </p:txBody>
-      </p:sp>
-      <p:sp>
-        <p:nvSpPr>
-          <p:cNvPr id="47" name="Rectangle: Rounded Corners 46">
-            <a:extLst>
-              <a:ext uri="{FF2B5EF4-FFF2-40B4-BE49-F238E27FC236}">
-                <a16:creationId xmlns:a16="http://schemas.microsoft.com/office/drawing/2014/main" id="{397C353C-D7EE-1C99-378E-A0155E2A3CF7}"/>
-              </a:ext>
-            </a:extLst>
-          </p:cNvPr>
-          <p:cNvSpPr/>
-          <p:nvPr/>
-        </p:nvSpPr>
-        <p:spPr>
-          <a:xfrm>
-            <a:off x="11003669" y="2424987"/>
-            <a:ext cx="779668" cy="210038"/>
-          </a:xfrm>
-          <a:prstGeom prst="roundRect">
-            <a:avLst/>
-          </a:prstGeom>
-          <a:noFill/>
-          <a:ln>
-            <a:solidFill>
-              <a:schemeClr val="accent2">
-                <a:lumMod val="60000"/>
-                <a:lumOff val="40000"/>
-              </a:schemeClr>
-            </a:solidFill>
-          </a:ln>
-        </p:spPr>
-        <p:style>
-          <a:lnRef idx="2">
-            <a:schemeClr val="accent1">
-              <a:shade val="15000"/>
-            </a:schemeClr>
-          </a:lnRef>
-          <a:fillRef idx="1">
-            <a:schemeClr val="accent1"/>
-          </a:fillRef>
-          <a:effectRef idx="0">
-            <a:schemeClr val="accent1"/>
-          </a:effectRef>
-          <a:fontRef idx="minor">
-            <a:schemeClr val="lt1"/>
-          </a:fontRef>
-        </p:style>
-        <p:txBody>
-          <a:bodyPr rtlCol="0" anchor="ctr"/>
-          <a:lstStyle/>
-          <a:p>
-            <a:pPr algn="ctr"/>
-            <a:r>
-              <a:rPr lang="en-US" b="1" dirty="0">
-                <a:solidFill>
-                  <a:schemeClr val="tx1"/>
-                </a:solidFill>
-              </a:rPr>
-              <a:t>D1</a:t>
-            </a:r>
-          </a:p>
-        </p:txBody>
-      </p:sp>
-      <p:sp>
-        <p:nvSpPr>
-          <p:cNvPr id="48" name="Rectangle: Rounded Corners 47">
-            <a:extLst>
-              <a:ext uri="{FF2B5EF4-FFF2-40B4-BE49-F238E27FC236}">
-                <a16:creationId xmlns:a16="http://schemas.microsoft.com/office/drawing/2014/main" id="{06434B9E-408E-A816-BF9C-4CA1F9716727}"/>
-              </a:ext>
-            </a:extLst>
-          </p:cNvPr>
-          <p:cNvSpPr/>
-          <p:nvPr/>
-        </p:nvSpPr>
-        <p:spPr>
-          <a:xfrm>
-            <a:off x="11003669" y="2777412"/>
-            <a:ext cx="779668" cy="210038"/>
-          </a:xfrm>
-          <a:prstGeom prst="roundRect">
-            <a:avLst/>
-          </a:prstGeom>
-          <a:noFill/>
-          <a:ln>
-            <a:solidFill>
-              <a:schemeClr val="accent2">
-                <a:lumMod val="60000"/>
-                <a:lumOff val="40000"/>
-              </a:schemeClr>
-            </a:solidFill>
-          </a:ln>
-        </p:spPr>
-        <p:style>
-          <a:lnRef idx="2">
-            <a:schemeClr val="accent1">
-              <a:shade val="15000"/>
-            </a:schemeClr>
-          </a:lnRef>
-          <a:fillRef idx="1">
-            <a:schemeClr val="accent1"/>
-          </a:fillRef>
-          <a:effectRef idx="0">
-            <a:schemeClr val="accent1"/>
-          </a:effectRef>
-          <a:fontRef idx="minor">
-            <a:schemeClr val="lt1"/>
-          </a:fontRef>
-        </p:style>
-        <p:txBody>
-          <a:bodyPr rtlCol="0" anchor="ctr"/>
-          <a:lstStyle/>
-          <a:p>
-            <a:pPr algn="ctr"/>
-            <a:r>
-              <a:rPr lang="en-US" b="1" dirty="0">
-                <a:solidFill>
-                  <a:schemeClr val="tx1"/>
-                </a:solidFill>
-              </a:rPr>
-              <a:t>D2</a:t>
-            </a:r>
-          </a:p>
-        </p:txBody>
-      </p:sp>
-      <p:sp>
-        <p:nvSpPr>
-          <p:cNvPr id="49" name="Rectangle: Rounded Corners 48">
-            <a:extLst>
-              <a:ext uri="{FF2B5EF4-FFF2-40B4-BE49-F238E27FC236}">
-                <a16:creationId xmlns:a16="http://schemas.microsoft.com/office/drawing/2014/main" id="{2EA335EA-C189-FAF6-1C31-0527BCEF6E36}"/>
-              </a:ext>
-            </a:extLst>
-          </p:cNvPr>
-          <p:cNvSpPr/>
-          <p:nvPr/>
-        </p:nvSpPr>
-        <p:spPr>
-          <a:xfrm>
-            <a:off x="11003669" y="3129837"/>
-            <a:ext cx="779668" cy="210038"/>
-          </a:xfrm>
-          <a:prstGeom prst="roundRect">
-            <a:avLst/>
-          </a:prstGeom>
-          <a:noFill/>
-          <a:ln>
-            <a:solidFill>
-              <a:schemeClr val="accent2">
-                <a:lumMod val="60000"/>
-                <a:lumOff val="40000"/>
-              </a:schemeClr>
-            </a:solidFill>
-          </a:ln>
-        </p:spPr>
-        <p:style>
-          <a:lnRef idx="2">
-            <a:schemeClr val="accent1">
-              <a:shade val="15000"/>
-            </a:schemeClr>
-          </a:lnRef>
-          <a:fillRef idx="1">
-            <a:schemeClr val="accent1"/>
-          </a:fillRef>
-          <a:effectRef idx="0">
-            <a:schemeClr val="accent1"/>
-          </a:effectRef>
-          <a:fontRef idx="minor">
-            <a:schemeClr val="lt1"/>
-          </a:fontRef>
-        </p:style>
-        <p:txBody>
-          <a:bodyPr rtlCol="0" anchor="ctr"/>
-          <a:lstStyle/>
-          <a:p>
-            <a:pPr algn="ctr"/>
-            <a:r>
-              <a:rPr lang="en-US" b="1" dirty="0">
-                <a:solidFill>
-                  <a:schemeClr val="tx1"/>
-                </a:solidFill>
-              </a:rPr>
-              <a:t>D3</a:t>
-            </a:r>
-          </a:p>
-        </p:txBody>
-      </p:sp>
-      <p:sp>
-        <p:nvSpPr>
-          <p:cNvPr id="50" name="Rectangle: Rounded Corners 49">
-            <a:extLst>
-              <a:ext uri="{FF2B5EF4-FFF2-40B4-BE49-F238E27FC236}">
-                <a16:creationId xmlns:a16="http://schemas.microsoft.com/office/drawing/2014/main" id="{C50A731F-9E4D-0613-2077-68E60856331E}"/>
-              </a:ext>
-            </a:extLst>
-          </p:cNvPr>
-          <p:cNvSpPr/>
-          <p:nvPr/>
-        </p:nvSpPr>
-        <p:spPr>
-          <a:xfrm>
-            <a:off x="11003669" y="3447126"/>
-            <a:ext cx="779668" cy="210038"/>
-          </a:xfrm>
-          <a:prstGeom prst="roundRect">
-            <a:avLst/>
-          </a:prstGeom>
-          <a:noFill/>
-          <a:ln>
-            <a:solidFill>
-              <a:schemeClr val="accent2">
-                <a:lumMod val="60000"/>
-                <a:lumOff val="40000"/>
-              </a:schemeClr>
-            </a:solidFill>
-          </a:ln>
-        </p:spPr>
-        <p:style>
-          <a:lnRef idx="2">
-            <a:schemeClr val="accent1">
-              <a:shade val="15000"/>
-            </a:schemeClr>
-          </a:lnRef>
-          <a:fillRef idx="1">
-            <a:schemeClr val="accent1"/>
-          </a:fillRef>
-          <a:effectRef idx="0">
-            <a:schemeClr val="accent1"/>
-          </a:effectRef>
-          <a:fontRef idx="minor">
-            <a:schemeClr val="lt1"/>
-          </a:fontRef>
-        </p:style>
-        <p:txBody>
-          <a:bodyPr rtlCol="0" anchor="ctr"/>
-          <a:lstStyle/>
-          <a:p>
-            <a:pPr algn="ctr"/>
-            <a:r>
-              <a:rPr lang="en-US" b="1" dirty="0">
-                <a:solidFill>
-                  <a:schemeClr val="tx1"/>
-                </a:solidFill>
-              </a:rPr>
-              <a:t>D4</a:t>
-            </a:r>
-          </a:p>
-        </p:txBody>
-      </p:sp>
-      <p:sp>
-        <p:nvSpPr>
-          <p:cNvPr id="51" name="Rectangle: Rounded Corners 50">
-            <a:extLst>
-              <a:ext uri="{FF2B5EF4-FFF2-40B4-BE49-F238E27FC236}">
-                <a16:creationId xmlns:a16="http://schemas.microsoft.com/office/drawing/2014/main" id="{F4BD5024-0846-B6A6-711D-9A58D9C3FBE5}"/>
-              </a:ext>
-            </a:extLst>
-          </p:cNvPr>
-          <p:cNvSpPr/>
-          <p:nvPr/>
-        </p:nvSpPr>
-        <p:spPr>
-          <a:xfrm>
-            <a:off x="11003669" y="3799551"/>
-            <a:ext cx="779668" cy="210038"/>
-          </a:xfrm>
-          <a:prstGeom prst="roundRect">
-            <a:avLst/>
-          </a:prstGeom>
-          <a:noFill/>
-          <a:ln>
-            <a:solidFill>
-              <a:schemeClr val="accent2">
-                <a:lumMod val="60000"/>
-                <a:lumOff val="40000"/>
-              </a:schemeClr>
-            </a:solidFill>
-          </a:ln>
-        </p:spPr>
-        <p:style>
-          <a:lnRef idx="2">
-            <a:schemeClr val="accent1">
-              <a:shade val="15000"/>
-            </a:schemeClr>
-          </a:lnRef>
-          <a:fillRef idx="1">
-            <a:schemeClr val="accent1"/>
-          </a:fillRef>
-          <a:effectRef idx="0">
-            <a:schemeClr val="accent1"/>
-          </a:effectRef>
-          <a:fontRef idx="minor">
-            <a:schemeClr val="lt1"/>
-          </a:fontRef>
-        </p:style>
-        <p:txBody>
-          <a:bodyPr rtlCol="0" anchor="ctr"/>
-          <a:lstStyle/>
-          <a:p>
-            <a:pPr algn="ctr"/>
-            <a:r>
-              <a:rPr lang="en-US" b="1" dirty="0">
-                <a:solidFill>
-                  <a:schemeClr val="tx1"/>
-                </a:solidFill>
-              </a:rPr>
-              <a:t>D5</a:t>
-            </a:r>
-          </a:p>
-        </p:txBody>
-      </p:sp>
-      <p:sp>
-        <p:nvSpPr>
-          <p:cNvPr id="52" name="Rectangle: Rounded Corners 51">
-            <a:extLst>
-              <a:ext uri="{FF2B5EF4-FFF2-40B4-BE49-F238E27FC236}">
-                <a16:creationId xmlns:a16="http://schemas.microsoft.com/office/drawing/2014/main" id="{1BE675F5-8C7C-8D8C-90C7-318CBF3AE83B}"/>
-              </a:ext>
-            </a:extLst>
-          </p:cNvPr>
-          <p:cNvSpPr/>
-          <p:nvPr/>
-        </p:nvSpPr>
-        <p:spPr>
-          <a:xfrm>
-            <a:off x="11003669" y="4151976"/>
-            <a:ext cx="779668" cy="210038"/>
-          </a:xfrm>
-          <a:prstGeom prst="roundRect">
-            <a:avLst/>
-          </a:prstGeom>
-          <a:noFill/>
-          <a:ln>
-            <a:solidFill>
-              <a:schemeClr val="accent2">
-                <a:lumMod val="60000"/>
-                <a:lumOff val="40000"/>
-              </a:schemeClr>
-            </a:solidFill>
-          </a:ln>
-        </p:spPr>
-        <p:style>
-          <a:lnRef idx="2">
-            <a:schemeClr val="accent1">
-              <a:shade val="15000"/>
-            </a:schemeClr>
-          </a:lnRef>
-          <a:fillRef idx="1">
-            <a:schemeClr val="accent1"/>
-          </a:fillRef>
-          <a:effectRef idx="0">
-            <a:schemeClr val="accent1"/>
-          </a:effectRef>
-          <a:fontRef idx="minor">
-            <a:schemeClr val="lt1"/>
-          </a:fontRef>
-        </p:style>
-        <p:txBody>
-          <a:bodyPr rtlCol="0" anchor="ctr"/>
-          <a:lstStyle/>
-          <a:p>
-            <a:pPr algn="ctr"/>
-            <a:r>
-              <a:rPr lang="en-US" b="1" dirty="0">
-                <a:solidFill>
-                  <a:schemeClr val="tx1"/>
-                </a:solidFill>
-              </a:rPr>
-              <a:t>D6</a:t>
-            </a:r>
-          </a:p>
-        </p:txBody>
-      </p:sp>
-      <p:sp>
-        <p:nvSpPr>
-          <p:cNvPr id="53" name="Rectangle: Rounded Corners 52">
-            <a:extLst>
-              <a:ext uri="{FF2B5EF4-FFF2-40B4-BE49-F238E27FC236}">
-                <a16:creationId xmlns:a16="http://schemas.microsoft.com/office/drawing/2014/main" id="{23A42B1E-D06F-C30D-4FF1-94067DC21B2A}"/>
-              </a:ext>
-            </a:extLst>
-          </p:cNvPr>
-          <p:cNvSpPr/>
-          <p:nvPr/>
-        </p:nvSpPr>
-        <p:spPr>
-          <a:xfrm>
-            <a:off x="11003669" y="4504401"/>
-            <a:ext cx="779668" cy="210038"/>
-          </a:xfrm>
-          <a:prstGeom prst="roundRect">
-            <a:avLst/>
-          </a:prstGeom>
-          <a:noFill/>
-          <a:ln>
-            <a:solidFill>
-              <a:schemeClr val="accent2">
-                <a:lumMod val="60000"/>
-                <a:lumOff val="40000"/>
-              </a:schemeClr>
-            </a:solidFill>
-          </a:ln>
-        </p:spPr>
-        <p:style>
-          <a:lnRef idx="2">
-            <a:schemeClr val="accent1">
-              <a:shade val="15000"/>
-            </a:schemeClr>
-          </a:lnRef>
-          <a:fillRef idx="1">
-            <a:schemeClr val="accent1"/>
-          </a:fillRef>
-          <a:effectRef idx="0">
-            <a:schemeClr val="accent1"/>
-          </a:effectRef>
-          <a:fontRef idx="minor">
-            <a:schemeClr val="lt1"/>
-          </a:fontRef>
-        </p:style>
-        <p:txBody>
-          <a:bodyPr rtlCol="0" anchor="ctr"/>
-          <a:lstStyle/>
-          <a:p>
-            <a:pPr algn="ctr"/>
-            <a:r>
-              <a:rPr lang="en-US" b="1" dirty="0">
-                <a:solidFill>
-                  <a:schemeClr val="tx1"/>
-                </a:solidFill>
-              </a:rPr>
-              <a:t>D7</a:t>
-            </a:r>
-          </a:p>
-        </p:txBody>
-      </p:sp>
-      <p:sp>
-        <p:nvSpPr>
-          <p:cNvPr id="54" name="Rectangle: Rounded Corners 53">
-            <a:extLst>
-              <a:ext uri="{FF2B5EF4-FFF2-40B4-BE49-F238E27FC236}">
-                <a16:creationId xmlns:a16="http://schemas.microsoft.com/office/drawing/2014/main" id="{798BF1DE-D868-B4D7-D5C7-65321B835B5D}"/>
-              </a:ext>
-            </a:extLst>
-          </p:cNvPr>
-          <p:cNvSpPr/>
-          <p:nvPr/>
-        </p:nvSpPr>
-        <p:spPr>
-          <a:xfrm>
-            <a:off x="11003669" y="4821690"/>
-            <a:ext cx="779668" cy="210038"/>
-          </a:xfrm>
-          <a:prstGeom prst="roundRect">
-            <a:avLst/>
-          </a:prstGeom>
-          <a:noFill/>
-          <a:ln>
-            <a:solidFill>
-              <a:schemeClr val="accent2">
-                <a:lumMod val="60000"/>
-                <a:lumOff val="40000"/>
-              </a:schemeClr>
-            </a:solidFill>
-          </a:ln>
-        </p:spPr>
-        <p:style>
-          <a:lnRef idx="2">
-            <a:schemeClr val="accent1">
-              <a:shade val="15000"/>
-            </a:schemeClr>
-          </a:lnRef>
-          <a:fillRef idx="1">
-            <a:schemeClr val="accent1"/>
-          </a:fillRef>
-          <a:effectRef idx="0">
-            <a:schemeClr val="accent1"/>
-          </a:effectRef>
-          <a:fontRef idx="minor">
-            <a:schemeClr val="lt1"/>
-          </a:fontRef>
-        </p:style>
-        <p:txBody>
-          <a:bodyPr rtlCol="0" anchor="ctr"/>
-          <a:lstStyle/>
-          <a:p>
-            <a:pPr algn="ctr"/>
-            <a:r>
-              <a:rPr lang="en-US" b="1" dirty="0">
-                <a:solidFill>
-                  <a:schemeClr val="tx1"/>
-                </a:solidFill>
-              </a:rPr>
-              <a:t>D8</a:t>
-            </a:r>
-          </a:p>
-        </p:txBody>
-      </p:sp>
-      <p:sp>
-        <p:nvSpPr>
-          <p:cNvPr id="55" name="Rectangle: Rounded Corners 54">
-            <a:extLst>
-              <a:ext uri="{FF2B5EF4-FFF2-40B4-BE49-F238E27FC236}">
-                <a16:creationId xmlns:a16="http://schemas.microsoft.com/office/drawing/2014/main" id="{893FEC5C-B23B-49C1-E0F7-C10AB73CE4AA}"/>
-              </a:ext>
-            </a:extLst>
-          </p:cNvPr>
-          <p:cNvSpPr/>
-          <p:nvPr/>
-        </p:nvSpPr>
-        <p:spPr>
-          <a:xfrm>
-            <a:off x="11003669" y="5174115"/>
-            <a:ext cx="779668" cy="210038"/>
-          </a:xfrm>
-          <a:prstGeom prst="roundRect">
-            <a:avLst/>
-          </a:prstGeom>
-          <a:noFill/>
-          <a:ln>
-            <a:solidFill>
-              <a:schemeClr val="accent2">
-                <a:lumMod val="60000"/>
-                <a:lumOff val="40000"/>
-              </a:schemeClr>
-            </a:solidFill>
-          </a:ln>
-        </p:spPr>
-        <p:style>
-          <a:lnRef idx="2">
-            <a:schemeClr val="accent1">
-              <a:shade val="15000"/>
-            </a:schemeClr>
-          </a:lnRef>
-          <a:fillRef idx="1">
-            <a:schemeClr val="accent1"/>
-          </a:fillRef>
-          <a:effectRef idx="0">
-            <a:schemeClr val="accent1"/>
-          </a:effectRef>
-          <a:fontRef idx="minor">
-            <a:schemeClr val="lt1"/>
-          </a:fontRef>
-        </p:style>
-        <p:txBody>
-          <a:bodyPr rtlCol="0" anchor="ctr"/>
-          <a:lstStyle/>
-          <a:p>
-            <a:pPr algn="ctr"/>
-            <a:r>
-              <a:rPr lang="en-US" b="1" dirty="0">
-                <a:solidFill>
-                  <a:schemeClr val="tx1"/>
-                </a:solidFill>
-              </a:rPr>
-              <a:t>D9</a:t>
-            </a:r>
-          </a:p>
-        </p:txBody>
-      </p:sp>
-      <p:sp>
-        <p:nvSpPr>
-          <p:cNvPr id="56" name="Rectangle: Rounded Corners 55">
-            <a:extLst>
-              <a:ext uri="{FF2B5EF4-FFF2-40B4-BE49-F238E27FC236}">
-                <a16:creationId xmlns:a16="http://schemas.microsoft.com/office/drawing/2014/main" id="{40AD6F1D-E8FA-79AD-4333-6D68F289EC4C}"/>
-              </a:ext>
-            </a:extLst>
-          </p:cNvPr>
-          <p:cNvSpPr/>
-          <p:nvPr/>
-        </p:nvSpPr>
-        <p:spPr>
-          <a:xfrm>
-            <a:off x="11003669" y="5526540"/>
-            <a:ext cx="779668" cy="210038"/>
-          </a:xfrm>
-          <a:prstGeom prst="roundRect">
-            <a:avLst/>
-          </a:prstGeom>
-          <a:noFill/>
-          <a:ln>
-            <a:solidFill>
-              <a:schemeClr val="accent2">
-                <a:lumMod val="60000"/>
-                <a:lumOff val="40000"/>
-              </a:schemeClr>
-            </a:solidFill>
-          </a:ln>
-        </p:spPr>
-        <p:style>
-          <a:lnRef idx="2">
-            <a:schemeClr val="accent1">
-              <a:shade val="15000"/>
-            </a:schemeClr>
-          </a:lnRef>
-          <a:fillRef idx="1">
-            <a:schemeClr val="accent1"/>
-          </a:fillRef>
-          <a:effectRef idx="0">
-            <a:schemeClr val="accent1"/>
-          </a:effectRef>
-          <a:fontRef idx="minor">
-            <a:schemeClr val="lt1"/>
-          </a:fontRef>
-        </p:style>
-        <p:txBody>
-          <a:bodyPr rtlCol="0" anchor="ctr"/>
-          <a:lstStyle/>
-          <a:p>
-            <a:pPr algn="ctr"/>
-            <a:r>
-              <a:rPr lang="en-US" b="1" dirty="0">
-                <a:solidFill>
-                  <a:schemeClr val="tx1"/>
-                </a:solidFill>
-              </a:rPr>
-              <a:t>D10</a:t>
-            </a:r>
-          </a:p>
-        </p:txBody>
-      </p:sp>
-      <p:sp>
-        <p:nvSpPr>
-          <p:cNvPr id="57" name="Rectangle: Rounded Corners 56">
-            <a:extLst>
-              <a:ext uri="{FF2B5EF4-FFF2-40B4-BE49-F238E27FC236}">
-                <a16:creationId xmlns:a16="http://schemas.microsoft.com/office/drawing/2014/main" id="{9E5F1A34-DC27-7AD0-FA1E-62084AD3A4F3}"/>
-              </a:ext>
-            </a:extLst>
-          </p:cNvPr>
-          <p:cNvSpPr/>
-          <p:nvPr/>
-        </p:nvSpPr>
-        <p:spPr>
-          <a:xfrm>
-            <a:off x="11003669" y="5878965"/>
-            <a:ext cx="779668" cy="210038"/>
-          </a:xfrm>
-          <a:prstGeom prst="roundRect">
-            <a:avLst/>
-          </a:prstGeom>
-          <a:noFill/>
-          <a:ln>
-            <a:solidFill>
-              <a:schemeClr val="accent2">
-                <a:lumMod val="60000"/>
-                <a:lumOff val="40000"/>
-              </a:schemeClr>
-            </a:solidFill>
-          </a:ln>
-        </p:spPr>
-        <p:style>
-          <a:lnRef idx="2">
-            <a:schemeClr val="accent1">
-              <a:shade val="15000"/>
-            </a:schemeClr>
-          </a:lnRef>
-          <a:fillRef idx="1">
-            <a:schemeClr val="accent1"/>
-          </a:fillRef>
-          <a:effectRef idx="0">
-            <a:schemeClr val="accent1"/>
-          </a:effectRef>
-          <a:fontRef idx="minor">
-            <a:schemeClr val="lt1"/>
-          </a:fontRef>
-        </p:style>
-        <p:txBody>
-          <a:bodyPr rtlCol="0" anchor="ctr"/>
-          <a:lstStyle/>
-          <a:p>
-            <a:pPr algn="ctr"/>
-            <a:r>
-              <a:rPr lang="en-US" b="1" dirty="0">
-                <a:solidFill>
-                  <a:schemeClr val="tx1"/>
-                </a:solidFill>
-              </a:rPr>
-              <a:t>D11</a:t>
-            </a:r>
-          </a:p>
-        </p:txBody>
-      </p:sp>
-    </p:spTree>
-    <p:extLst>
-      <p:ext uri="{BB962C8B-B14F-4D97-AF65-F5344CB8AC3E}">
-        <p14:creationId xmlns:p14="http://schemas.microsoft.com/office/powerpoint/2010/main" val="1749829247"/>
-      </p:ext>
-    </p:extLst>
-  </p:cSld>
-  <p:clrMapOvr>
-    <a:masterClrMapping/>
-  </p:clrMapOvr>
-</p:sld>
-</file>
-
-<file path=ppt/slides/slide6.xml><?xml version="1.0" encoding="utf-8"?>
 <p:sld xmlns:a="http://schemas.openxmlformats.org/drawingml/2006/main" xmlns:r="http://schemas.openxmlformats.org/officeDocument/2006/relationships" xmlns:p="http://schemas.openxmlformats.org/presentationml/2006/main">
   <p:cSld>
     <p:spTree>
@@ -11478,6 +9841,1643 @@
 </p:sld>
 </file>
 
+<file path=ppt/slides/slide6.xml><?xml version="1.0" encoding="utf-8"?>
+<p:sld xmlns:a="http://schemas.openxmlformats.org/drawingml/2006/main" xmlns:r="http://schemas.openxmlformats.org/officeDocument/2006/relationships" xmlns:p="http://schemas.openxmlformats.org/presentationml/2006/main">
+  <p:cSld>
+    <p:spTree>
+      <p:nvGrpSpPr>
+        <p:cNvPr id="1" name=""/>
+        <p:cNvGrpSpPr/>
+        <p:nvPr/>
+      </p:nvGrpSpPr>
+      <p:grpSpPr>
+        <a:xfrm>
+          <a:off x="0" y="0"/>
+          <a:ext cx="0" cy="0"/>
+          <a:chOff x="0" y="0"/>
+          <a:chExt cx="0" cy="0"/>
+        </a:xfrm>
+      </p:grpSpPr>
+      <p:pic>
+        <p:nvPicPr>
+          <p:cNvPr id="16" name="Picture 15">
+            <a:extLst>
+              <a:ext uri="{FF2B5EF4-FFF2-40B4-BE49-F238E27FC236}">
+                <a16:creationId xmlns:a16="http://schemas.microsoft.com/office/drawing/2014/main" id="{742BF245-A9C2-7ACA-A244-57FACF33FEB8}"/>
+              </a:ext>
+            </a:extLst>
+          </p:cNvPr>
+          <p:cNvPicPr>
+            <a:picLocks noChangeAspect="1"/>
+          </p:cNvPicPr>
+          <p:nvPr/>
+        </p:nvPicPr>
+        <p:blipFill>
+          <a:blip r:embed="rId2"/>
+          <a:stretch>
+            <a:fillRect/>
+          </a:stretch>
+        </p:blipFill>
+        <p:spPr>
+          <a:xfrm>
+            <a:off x="306422" y="607829"/>
+            <a:ext cx="2950527" cy="3165466"/>
+          </a:xfrm>
+          <a:prstGeom prst="rect">
+            <a:avLst/>
+          </a:prstGeom>
+        </p:spPr>
+      </p:pic>
+      <p:sp>
+        <p:nvSpPr>
+          <p:cNvPr id="17" name="TextBox 16">
+            <a:extLst>
+              <a:ext uri="{FF2B5EF4-FFF2-40B4-BE49-F238E27FC236}">
+                <a16:creationId xmlns:a16="http://schemas.microsoft.com/office/drawing/2014/main" id="{DE62E486-AC37-0DD3-1F0C-71E71A21ED26}"/>
+              </a:ext>
+            </a:extLst>
+          </p:cNvPr>
+          <p:cNvSpPr txBox="1"/>
+          <p:nvPr/>
+        </p:nvSpPr>
+        <p:spPr>
+          <a:xfrm>
+            <a:off x="450484" y="185752"/>
+            <a:ext cx="1934070" cy="307777"/>
+          </a:xfrm>
+          <a:prstGeom prst="rect">
+            <a:avLst/>
+          </a:prstGeom>
+          <a:noFill/>
+          <a:ln>
+            <a:solidFill>
+              <a:schemeClr val="tx1"/>
+            </a:solidFill>
+          </a:ln>
+        </p:spPr>
+        <p:txBody>
+          <a:bodyPr wrap="square" rtlCol="0">
+            <a:spAutoFit/>
+          </a:bodyPr>
+          <a:lstStyle/>
+          <a:p>
+            <a:pPr algn="ctr"/>
+            <a:r>
+              <a:rPr lang="en-US" sz="1400" dirty="0"/>
+              <a:t>Excel Sheet Calculator</a:t>
+            </a:r>
+          </a:p>
+        </p:txBody>
+      </p:sp>
+      <p:sp>
+        <p:nvSpPr>
+          <p:cNvPr id="29" name="TextBox 28">
+            <a:extLst>
+              <a:ext uri="{FF2B5EF4-FFF2-40B4-BE49-F238E27FC236}">
+                <a16:creationId xmlns:a16="http://schemas.microsoft.com/office/drawing/2014/main" id="{AF369CF3-183C-AB36-4DEC-BBF741F95E2B}"/>
+              </a:ext>
+            </a:extLst>
+          </p:cNvPr>
+          <p:cNvSpPr txBox="1"/>
+          <p:nvPr/>
+        </p:nvSpPr>
+        <p:spPr>
+          <a:xfrm>
+            <a:off x="3672044" y="218962"/>
+            <a:ext cx="2349619" cy="307777"/>
+          </a:xfrm>
+          <a:prstGeom prst="rect">
+            <a:avLst/>
+          </a:prstGeom>
+          <a:noFill/>
+          <a:ln>
+            <a:solidFill>
+              <a:schemeClr val="tx1"/>
+            </a:solidFill>
+          </a:ln>
+        </p:spPr>
+        <p:txBody>
+          <a:bodyPr wrap="square" rtlCol="0">
+            <a:spAutoFit/>
+          </a:bodyPr>
+          <a:lstStyle/>
+          <a:p>
+            <a:pPr algn="ctr"/>
+            <a:r>
+              <a:rPr lang="en-US" sz="1400" dirty="0"/>
+              <a:t>COMSOL Simulation</a:t>
+            </a:r>
+          </a:p>
+        </p:txBody>
+      </p:sp>
+      <p:pic>
+        <p:nvPicPr>
+          <p:cNvPr id="30" name="Picture 29">
+            <a:extLst>
+              <a:ext uri="{FF2B5EF4-FFF2-40B4-BE49-F238E27FC236}">
+                <a16:creationId xmlns:a16="http://schemas.microsoft.com/office/drawing/2014/main" id="{B147F649-6C33-C877-4513-CE7BE3D549CB}"/>
+              </a:ext>
+            </a:extLst>
+          </p:cNvPr>
+          <p:cNvPicPr>
+            <a:picLocks noChangeAspect="1"/>
+          </p:cNvPicPr>
+          <p:nvPr/>
+        </p:nvPicPr>
+        <p:blipFill>
+          <a:blip r:embed="rId3"/>
+          <a:srcRect l="8275" t="10957" r="6047" b="6925"/>
+          <a:stretch/>
+        </p:blipFill>
+        <p:spPr>
+          <a:xfrm rot="16200000">
+            <a:off x="6698003" y="1985444"/>
+            <a:ext cx="5758979" cy="3082515"/>
+          </a:xfrm>
+          <a:prstGeom prst="rect">
+            <a:avLst/>
+          </a:prstGeom>
+        </p:spPr>
+      </p:pic>
+      <p:grpSp>
+        <p:nvGrpSpPr>
+          <p:cNvPr id="2" name="Group 1">
+            <a:extLst>
+              <a:ext uri="{FF2B5EF4-FFF2-40B4-BE49-F238E27FC236}">
+                <a16:creationId xmlns:a16="http://schemas.microsoft.com/office/drawing/2014/main" id="{CCEFCCF8-6063-2809-5FAA-6E7A7AF1DFF9}"/>
+              </a:ext>
+            </a:extLst>
+          </p:cNvPr>
+          <p:cNvGrpSpPr/>
+          <p:nvPr/>
+        </p:nvGrpSpPr>
+        <p:grpSpPr>
+          <a:xfrm rot="10800000">
+            <a:off x="9343183" y="2893999"/>
+            <a:ext cx="499852" cy="2920436"/>
+            <a:chOff x="9343183" y="2893999"/>
+            <a:chExt cx="499852" cy="2920436"/>
+          </a:xfrm>
+        </p:grpSpPr>
+        <p:sp>
+          <p:nvSpPr>
+            <p:cNvPr id="31" name="Arrow: Right 30">
+              <a:extLst>
+                <a:ext uri="{FF2B5EF4-FFF2-40B4-BE49-F238E27FC236}">
+                  <a16:creationId xmlns:a16="http://schemas.microsoft.com/office/drawing/2014/main" id="{EA56CE58-C3C1-15A7-12B9-A2A007E84C38}"/>
+                </a:ext>
+              </a:extLst>
+            </p:cNvPr>
+            <p:cNvSpPr/>
+            <p:nvPr/>
+          </p:nvSpPr>
+          <p:spPr>
+            <a:xfrm rot="5400000">
+              <a:off x="7988997" y="4248185"/>
+              <a:ext cx="2920434" cy="212062"/>
+            </a:xfrm>
+            <a:prstGeom prst="rightArrow">
+              <a:avLst/>
+            </a:prstGeom>
+            <a:solidFill>
+              <a:srgbClr val="0070C0"/>
+            </a:solidFill>
+            <a:ln>
+              <a:solidFill>
+                <a:srgbClr val="002060"/>
+              </a:solidFill>
+            </a:ln>
+          </p:spPr>
+          <p:style>
+            <a:lnRef idx="2">
+              <a:schemeClr val="accent1">
+                <a:shade val="15000"/>
+              </a:schemeClr>
+            </a:lnRef>
+            <a:fillRef idx="1">
+              <a:schemeClr val="accent1"/>
+            </a:fillRef>
+            <a:effectRef idx="0">
+              <a:schemeClr val="accent1"/>
+            </a:effectRef>
+            <a:fontRef idx="minor">
+              <a:schemeClr val="lt1"/>
+            </a:fontRef>
+          </p:style>
+          <p:txBody>
+            <a:bodyPr rtlCol="0" anchor="ctr"/>
+            <a:lstStyle/>
+            <a:p>
+              <a:pPr algn="ctr"/>
+              <a:endParaRPr lang="en-US" dirty="0"/>
+            </a:p>
+          </p:txBody>
+        </p:sp>
+        <p:sp>
+          <p:nvSpPr>
+            <p:cNvPr id="32" name="Arrow: Right 31">
+              <a:extLst>
+                <a:ext uri="{FF2B5EF4-FFF2-40B4-BE49-F238E27FC236}">
+                  <a16:creationId xmlns:a16="http://schemas.microsoft.com/office/drawing/2014/main" id="{2A293891-649B-D3A5-13BF-DC5A49D57273}"/>
+                </a:ext>
+              </a:extLst>
+            </p:cNvPr>
+            <p:cNvSpPr/>
+            <p:nvPr/>
+          </p:nvSpPr>
+          <p:spPr>
+            <a:xfrm rot="16200000">
+              <a:off x="8276787" y="4248187"/>
+              <a:ext cx="2920436" cy="212060"/>
+            </a:xfrm>
+            <a:prstGeom prst="rightArrow">
+              <a:avLst/>
+            </a:prstGeom>
+            <a:solidFill>
+              <a:srgbClr val="FF0000"/>
+            </a:solidFill>
+            <a:ln>
+              <a:solidFill>
+                <a:srgbClr val="C00000"/>
+              </a:solidFill>
+            </a:ln>
+          </p:spPr>
+          <p:style>
+            <a:lnRef idx="2">
+              <a:schemeClr val="accent1">
+                <a:shade val="15000"/>
+              </a:schemeClr>
+            </a:lnRef>
+            <a:fillRef idx="1">
+              <a:schemeClr val="accent1"/>
+            </a:fillRef>
+            <a:effectRef idx="0">
+              <a:schemeClr val="accent1"/>
+            </a:effectRef>
+            <a:fontRef idx="minor">
+              <a:schemeClr val="lt1"/>
+            </a:fontRef>
+          </p:style>
+          <p:txBody>
+            <a:bodyPr rtlCol="0" anchor="ctr"/>
+            <a:lstStyle/>
+            <a:p>
+              <a:pPr algn="ctr"/>
+              <a:endParaRPr lang="en-US" dirty="0"/>
+            </a:p>
+          </p:txBody>
+        </p:sp>
+      </p:grpSp>
+      <p:grpSp>
+        <p:nvGrpSpPr>
+          <p:cNvPr id="3" name="Group 2">
+            <a:extLst>
+              <a:ext uri="{FF2B5EF4-FFF2-40B4-BE49-F238E27FC236}">
+                <a16:creationId xmlns:a16="http://schemas.microsoft.com/office/drawing/2014/main" id="{50AF9F03-E3C0-1075-2479-2437ED53D1E3}"/>
+              </a:ext>
+            </a:extLst>
+          </p:cNvPr>
+          <p:cNvGrpSpPr/>
+          <p:nvPr/>
+        </p:nvGrpSpPr>
+        <p:grpSpPr>
+          <a:xfrm rot="10800000">
+            <a:off x="9343183" y="1194739"/>
+            <a:ext cx="499852" cy="500937"/>
+            <a:chOff x="9343183" y="1194739"/>
+            <a:chExt cx="499852" cy="500937"/>
+          </a:xfrm>
+        </p:grpSpPr>
+        <p:sp>
+          <p:nvSpPr>
+            <p:cNvPr id="33" name="Arrow: Right 32">
+              <a:extLst>
+                <a:ext uri="{FF2B5EF4-FFF2-40B4-BE49-F238E27FC236}">
+                  <a16:creationId xmlns:a16="http://schemas.microsoft.com/office/drawing/2014/main" id="{EF1361FC-0531-66CA-1DDE-EAAE9177ED60}"/>
+                </a:ext>
+              </a:extLst>
+            </p:cNvPr>
+            <p:cNvSpPr/>
+            <p:nvPr/>
+          </p:nvSpPr>
+          <p:spPr>
+            <a:xfrm rot="16200000">
+              <a:off x="9198744" y="1339178"/>
+              <a:ext cx="500937" cy="212060"/>
+            </a:xfrm>
+            <a:prstGeom prst="rightArrow">
+              <a:avLst/>
+            </a:prstGeom>
+            <a:solidFill>
+              <a:srgbClr val="0070C0"/>
+            </a:solidFill>
+            <a:ln>
+              <a:solidFill>
+                <a:srgbClr val="002060"/>
+              </a:solidFill>
+            </a:ln>
+          </p:spPr>
+          <p:style>
+            <a:lnRef idx="2">
+              <a:schemeClr val="accent1">
+                <a:shade val="15000"/>
+              </a:schemeClr>
+            </a:lnRef>
+            <a:fillRef idx="1">
+              <a:schemeClr val="accent1"/>
+            </a:fillRef>
+            <a:effectRef idx="0">
+              <a:schemeClr val="accent1"/>
+            </a:effectRef>
+            <a:fontRef idx="minor">
+              <a:schemeClr val="lt1"/>
+            </a:fontRef>
+          </p:style>
+          <p:txBody>
+            <a:bodyPr rtlCol="0" anchor="ctr"/>
+            <a:lstStyle/>
+            <a:p>
+              <a:pPr algn="ctr"/>
+              <a:endParaRPr lang="en-US"/>
+            </a:p>
+          </p:txBody>
+        </p:sp>
+        <p:sp>
+          <p:nvSpPr>
+            <p:cNvPr id="34" name="Arrow: Right 33">
+              <a:extLst>
+                <a:ext uri="{FF2B5EF4-FFF2-40B4-BE49-F238E27FC236}">
+                  <a16:creationId xmlns:a16="http://schemas.microsoft.com/office/drawing/2014/main" id="{6504D514-9473-6031-1B9A-CE97CEA8C232}"/>
+                </a:ext>
+              </a:extLst>
+            </p:cNvPr>
+            <p:cNvSpPr/>
+            <p:nvPr/>
+          </p:nvSpPr>
+          <p:spPr>
+            <a:xfrm rot="16200000" flipH="1">
+              <a:off x="9486537" y="1339177"/>
+              <a:ext cx="500935" cy="212060"/>
+            </a:xfrm>
+            <a:prstGeom prst="rightArrow">
+              <a:avLst/>
+            </a:prstGeom>
+            <a:solidFill>
+              <a:srgbClr val="FF0000"/>
+            </a:solidFill>
+            <a:ln>
+              <a:solidFill>
+                <a:srgbClr val="C00000"/>
+              </a:solidFill>
+            </a:ln>
+          </p:spPr>
+          <p:style>
+            <a:lnRef idx="2">
+              <a:schemeClr val="accent1">
+                <a:shade val="15000"/>
+              </a:schemeClr>
+            </a:lnRef>
+            <a:fillRef idx="1">
+              <a:schemeClr val="accent1"/>
+            </a:fillRef>
+            <a:effectRef idx="0">
+              <a:schemeClr val="accent1"/>
+            </a:effectRef>
+            <a:fontRef idx="minor">
+              <a:schemeClr val="lt1"/>
+            </a:fontRef>
+          </p:style>
+          <p:txBody>
+            <a:bodyPr rtlCol="0" anchor="ctr"/>
+            <a:lstStyle/>
+            <a:p>
+              <a:pPr algn="ctr"/>
+              <a:endParaRPr lang="en-US"/>
+            </a:p>
+          </p:txBody>
+        </p:sp>
+      </p:grpSp>
+      <p:sp>
+        <p:nvSpPr>
+          <p:cNvPr id="35" name="TextBox 34">
+            <a:extLst>
+              <a:ext uri="{FF2B5EF4-FFF2-40B4-BE49-F238E27FC236}">
+                <a16:creationId xmlns:a16="http://schemas.microsoft.com/office/drawing/2014/main" id="{FC29E358-76A0-7B0A-3725-0122CDBF18FB}"/>
+              </a:ext>
+            </a:extLst>
+          </p:cNvPr>
+          <p:cNvSpPr txBox="1"/>
+          <p:nvPr/>
+        </p:nvSpPr>
+        <p:spPr>
+          <a:xfrm>
+            <a:off x="8155785" y="232184"/>
+            <a:ext cx="2950378" cy="307777"/>
+          </a:xfrm>
+          <a:prstGeom prst="rect">
+            <a:avLst/>
+          </a:prstGeom>
+          <a:noFill/>
+          <a:ln>
+            <a:solidFill>
+              <a:schemeClr val="tx1"/>
+            </a:solidFill>
+          </a:ln>
+        </p:spPr>
+        <p:txBody>
+          <a:bodyPr wrap="square" rtlCol="0">
+            <a:spAutoFit/>
+          </a:bodyPr>
+          <a:lstStyle/>
+          <a:p>
+            <a:pPr algn="ctr"/>
+            <a:r>
+              <a:rPr lang="en-US" sz="1400" dirty="0"/>
+              <a:t>Expected Drift based on Simulation</a:t>
+            </a:r>
+          </a:p>
+        </p:txBody>
+      </p:sp>
+      <p:cxnSp>
+        <p:nvCxnSpPr>
+          <p:cNvPr id="36" name="Straight Connector 35">
+            <a:extLst>
+              <a:ext uri="{FF2B5EF4-FFF2-40B4-BE49-F238E27FC236}">
+                <a16:creationId xmlns:a16="http://schemas.microsoft.com/office/drawing/2014/main" id="{0A3B2172-8E51-42BE-1B79-2DECC7A194D8}"/>
+              </a:ext>
+            </a:extLst>
+          </p:cNvPr>
+          <p:cNvCxnSpPr>
+            <a:cxnSpLocks/>
+          </p:cNvCxnSpPr>
+          <p:nvPr/>
+        </p:nvCxnSpPr>
+        <p:spPr>
+          <a:xfrm>
+            <a:off x="7885228" y="1006665"/>
+            <a:ext cx="0" cy="4456382"/>
+          </a:xfrm>
+          <a:prstGeom prst="line">
+            <a:avLst/>
+          </a:prstGeom>
+          <a:ln w="38100"/>
+        </p:spPr>
+        <p:style>
+          <a:lnRef idx="2">
+            <a:schemeClr val="accent1"/>
+          </a:lnRef>
+          <a:fillRef idx="0">
+            <a:schemeClr val="accent1"/>
+          </a:fillRef>
+          <a:effectRef idx="1">
+            <a:schemeClr val="accent1"/>
+          </a:effectRef>
+          <a:fontRef idx="minor">
+            <a:schemeClr val="tx1"/>
+          </a:fontRef>
+        </p:style>
+      </p:cxnSp>
+      <p:cxnSp>
+        <p:nvCxnSpPr>
+          <p:cNvPr id="37" name="Straight Connector 36">
+            <a:extLst>
+              <a:ext uri="{FF2B5EF4-FFF2-40B4-BE49-F238E27FC236}">
+                <a16:creationId xmlns:a16="http://schemas.microsoft.com/office/drawing/2014/main" id="{B1600E67-5E8D-1311-B769-53BB98A0810E}"/>
+              </a:ext>
+            </a:extLst>
+          </p:cNvPr>
+          <p:cNvCxnSpPr>
+            <a:cxnSpLocks/>
+          </p:cNvCxnSpPr>
+          <p:nvPr/>
+        </p:nvCxnSpPr>
+        <p:spPr>
+          <a:xfrm>
+            <a:off x="3352800" y="1068118"/>
+            <a:ext cx="0" cy="4456382"/>
+          </a:xfrm>
+          <a:prstGeom prst="line">
+            <a:avLst/>
+          </a:prstGeom>
+          <a:ln w="38100"/>
+        </p:spPr>
+        <p:style>
+          <a:lnRef idx="2">
+            <a:schemeClr val="accent1"/>
+          </a:lnRef>
+          <a:fillRef idx="0">
+            <a:schemeClr val="accent1"/>
+          </a:fillRef>
+          <a:effectRef idx="1">
+            <a:schemeClr val="accent1"/>
+          </a:effectRef>
+          <a:fontRef idx="minor">
+            <a:schemeClr val="tx1"/>
+          </a:fontRef>
+        </p:style>
+      </p:cxnSp>
+      <p:sp>
+        <p:nvSpPr>
+          <p:cNvPr id="38" name="TextBox 37">
+            <a:extLst>
+              <a:ext uri="{FF2B5EF4-FFF2-40B4-BE49-F238E27FC236}">
+                <a16:creationId xmlns:a16="http://schemas.microsoft.com/office/drawing/2014/main" id="{C4A7165B-1185-A9DF-7CED-90BBB71B7697}"/>
+              </a:ext>
+            </a:extLst>
+          </p:cNvPr>
+          <p:cNvSpPr txBox="1"/>
+          <p:nvPr/>
+        </p:nvSpPr>
+        <p:spPr>
+          <a:xfrm>
+            <a:off x="450484" y="3927183"/>
+            <a:ext cx="2600379" cy="954107"/>
+          </a:xfrm>
+          <a:prstGeom prst="rect">
+            <a:avLst/>
+          </a:prstGeom>
+          <a:noFill/>
+          <a:ln>
+            <a:noFill/>
+          </a:ln>
+        </p:spPr>
+        <p:txBody>
+          <a:bodyPr wrap="square" rtlCol="0">
+            <a:spAutoFit/>
+          </a:bodyPr>
+          <a:lstStyle/>
+          <a:p>
+            <a:pPr algn="ctr"/>
+            <a:r>
+              <a:rPr lang="en-US" sz="1400" dirty="0"/>
+              <a:t>Changing the green box in the excel sheet will update all values. All other values are constant or set.</a:t>
+            </a:r>
+          </a:p>
+        </p:txBody>
+      </p:sp>
+      <p:pic>
+        <p:nvPicPr>
+          <p:cNvPr id="40" name="Picture 39">
+            <a:extLst>
+              <a:ext uri="{FF2B5EF4-FFF2-40B4-BE49-F238E27FC236}">
+                <a16:creationId xmlns:a16="http://schemas.microsoft.com/office/drawing/2014/main" id="{20EA7C80-3D69-8F3A-361C-FCAF39ABC22E}"/>
+              </a:ext>
+            </a:extLst>
+          </p:cNvPr>
+          <p:cNvPicPr>
+            <a:picLocks noChangeAspect="1"/>
+          </p:cNvPicPr>
+          <p:nvPr/>
+        </p:nvPicPr>
+        <p:blipFill>
+          <a:blip r:embed="rId4"/>
+          <a:srcRect l="27130" r="24742"/>
+          <a:stretch/>
+        </p:blipFill>
+        <p:spPr>
+          <a:xfrm rot="10800000">
+            <a:off x="3509955" y="621696"/>
+            <a:ext cx="3600728" cy="5813882"/>
+          </a:xfrm>
+          <a:prstGeom prst="rect">
+            <a:avLst/>
+          </a:prstGeom>
+        </p:spPr>
+      </p:pic>
+      <p:pic>
+        <p:nvPicPr>
+          <p:cNvPr id="41" name="Picture 40">
+            <a:extLst>
+              <a:ext uri="{FF2B5EF4-FFF2-40B4-BE49-F238E27FC236}">
+                <a16:creationId xmlns:a16="http://schemas.microsoft.com/office/drawing/2014/main" id="{56B2D32E-A669-911A-6099-4BB5BF26865C}"/>
+              </a:ext>
+            </a:extLst>
+          </p:cNvPr>
+          <p:cNvPicPr>
+            <a:picLocks noChangeAspect="1"/>
+          </p:cNvPicPr>
+          <p:nvPr/>
+        </p:nvPicPr>
+        <p:blipFill>
+          <a:blip r:embed="rId4"/>
+          <a:srcRect l="91123" t="2678" r="529" b="1417"/>
+          <a:stretch/>
+        </p:blipFill>
+        <p:spPr>
+          <a:xfrm>
+            <a:off x="7127102" y="493529"/>
+            <a:ext cx="669210" cy="5974968"/>
+          </a:xfrm>
+          <a:prstGeom prst="rect">
+            <a:avLst/>
+          </a:prstGeom>
+        </p:spPr>
+      </p:pic>
+      <p:sp>
+        <p:nvSpPr>
+          <p:cNvPr id="42" name="Rectangle: Rounded Corners 41">
+            <a:extLst>
+              <a:ext uri="{FF2B5EF4-FFF2-40B4-BE49-F238E27FC236}">
+                <a16:creationId xmlns:a16="http://schemas.microsoft.com/office/drawing/2014/main" id="{797FE3FD-D1E4-3D41-FA08-7F46FF6362E4}"/>
+              </a:ext>
+            </a:extLst>
+          </p:cNvPr>
+          <p:cNvSpPr/>
+          <p:nvPr/>
+        </p:nvSpPr>
+        <p:spPr>
+          <a:xfrm>
+            <a:off x="11003669" y="689122"/>
+            <a:ext cx="779668" cy="210038"/>
+          </a:xfrm>
+          <a:prstGeom prst="roundRect">
+            <a:avLst/>
+          </a:prstGeom>
+          <a:noFill/>
+          <a:ln>
+            <a:solidFill>
+              <a:schemeClr val="accent2">
+                <a:lumMod val="60000"/>
+                <a:lumOff val="40000"/>
+              </a:schemeClr>
+            </a:solidFill>
+          </a:ln>
+        </p:spPr>
+        <p:style>
+          <a:lnRef idx="2">
+            <a:schemeClr val="accent1">
+              <a:shade val="15000"/>
+            </a:schemeClr>
+          </a:lnRef>
+          <a:fillRef idx="1">
+            <a:schemeClr val="accent1"/>
+          </a:fillRef>
+          <a:effectRef idx="0">
+            <a:schemeClr val="accent1"/>
+          </a:effectRef>
+          <a:fontRef idx="minor">
+            <a:schemeClr val="lt1"/>
+          </a:fontRef>
+        </p:style>
+        <p:txBody>
+          <a:bodyPr rtlCol="0" anchor="ctr"/>
+          <a:lstStyle/>
+          <a:p>
+            <a:pPr algn="ctr"/>
+            <a:r>
+              <a:rPr lang="en-US" b="1" dirty="0">
+                <a:solidFill>
+                  <a:schemeClr val="tx1"/>
+                </a:solidFill>
+              </a:rPr>
+              <a:t>B4</a:t>
+            </a:r>
+          </a:p>
+        </p:txBody>
+      </p:sp>
+      <p:sp>
+        <p:nvSpPr>
+          <p:cNvPr id="43" name="Rectangle: Rounded Corners 42">
+            <a:extLst>
+              <a:ext uri="{FF2B5EF4-FFF2-40B4-BE49-F238E27FC236}">
+                <a16:creationId xmlns:a16="http://schemas.microsoft.com/office/drawing/2014/main" id="{4602054D-4BAC-104B-9BAD-15E8D684A81B}"/>
+              </a:ext>
+            </a:extLst>
+          </p:cNvPr>
+          <p:cNvSpPr/>
+          <p:nvPr/>
+        </p:nvSpPr>
+        <p:spPr>
+          <a:xfrm>
+            <a:off x="11003669" y="1041547"/>
+            <a:ext cx="779668" cy="210038"/>
+          </a:xfrm>
+          <a:prstGeom prst="roundRect">
+            <a:avLst/>
+          </a:prstGeom>
+          <a:noFill/>
+          <a:ln>
+            <a:solidFill>
+              <a:schemeClr val="accent2">
+                <a:lumMod val="60000"/>
+                <a:lumOff val="40000"/>
+              </a:schemeClr>
+            </a:solidFill>
+          </a:ln>
+        </p:spPr>
+        <p:style>
+          <a:lnRef idx="2">
+            <a:schemeClr val="accent1">
+              <a:shade val="15000"/>
+            </a:schemeClr>
+          </a:lnRef>
+          <a:fillRef idx="1">
+            <a:schemeClr val="accent1"/>
+          </a:fillRef>
+          <a:effectRef idx="0">
+            <a:schemeClr val="accent1"/>
+          </a:effectRef>
+          <a:fontRef idx="minor">
+            <a:schemeClr val="lt1"/>
+          </a:fontRef>
+        </p:style>
+        <p:txBody>
+          <a:bodyPr rtlCol="0" anchor="ctr"/>
+          <a:lstStyle/>
+          <a:p>
+            <a:pPr algn="ctr"/>
+            <a:r>
+              <a:rPr lang="en-US" b="1" dirty="0">
+                <a:solidFill>
+                  <a:schemeClr val="tx1"/>
+                </a:solidFill>
+              </a:rPr>
+              <a:t>B3</a:t>
+            </a:r>
+          </a:p>
+        </p:txBody>
+      </p:sp>
+      <p:sp>
+        <p:nvSpPr>
+          <p:cNvPr id="44" name="Rectangle: Rounded Corners 43">
+            <a:extLst>
+              <a:ext uri="{FF2B5EF4-FFF2-40B4-BE49-F238E27FC236}">
+                <a16:creationId xmlns:a16="http://schemas.microsoft.com/office/drawing/2014/main" id="{ECE62C2A-D7DE-8A3B-77CA-9E4A54A8849D}"/>
+              </a:ext>
+            </a:extLst>
+          </p:cNvPr>
+          <p:cNvSpPr/>
+          <p:nvPr/>
+        </p:nvSpPr>
+        <p:spPr>
+          <a:xfrm>
+            <a:off x="11003669" y="1393972"/>
+            <a:ext cx="779668" cy="210038"/>
+          </a:xfrm>
+          <a:prstGeom prst="roundRect">
+            <a:avLst/>
+          </a:prstGeom>
+          <a:noFill/>
+          <a:ln>
+            <a:solidFill>
+              <a:schemeClr val="accent2">
+                <a:lumMod val="60000"/>
+                <a:lumOff val="40000"/>
+              </a:schemeClr>
+            </a:solidFill>
+          </a:ln>
+        </p:spPr>
+        <p:style>
+          <a:lnRef idx="2">
+            <a:schemeClr val="accent1">
+              <a:shade val="15000"/>
+            </a:schemeClr>
+          </a:lnRef>
+          <a:fillRef idx="1">
+            <a:schemeClr val="accent1"/>
+          </a:fillRef>
+          <a:effectRef idx="0">
+            <a:schemeClr val="accent1"/>
+          </a:effectRef>
+          <a:fontRef idx="minor">
+            <a:schemeClr val="lt1"/>
+          </a:fontRef>
+        </p:style>
+        <p:txBody>
+          <a:bodyPr rtlCol="0" anchor="ctr"/>
+          <a:lstStyle/>
+          <a:p>
+            <a:pPr algn="ctr"/>
+            <a:r>
+              <a:rPr lang="en-US" b="1" dirty="0">
+                <a:solidFill>
+                  <a:schemeClr val="tx1"/>
+                </a:solidFill>
+              </a:rPr>
+              <a:t>B2</a:t>
+            </a:r>
+          </a:p>
+        </p:txBody>
+      </p:sp>
+      <p:sp>
+        <p:nvSpPr>
+          <p:cNvPr id="45" name="Rectangle: Rounded Corners 44">
+            <a:extLst>
+              <a:ext uri="{FF2B5EF4-FFF2-40B4-BE49-F238E27FC236}">
+                <a16:creationId xmlns:a16="http://schemas.microsoft.com/office/drawing/2014/main" id="{E3D02DE5-3A38-3F8C-9AB9-DE8B9D926FE5}"/>
+              </a:ext>
+            </a:extLst>
+          </p:cNvPr>
+          <p:cNvSpPr/>
+          <p:nvPr/>
+        </p:nvSpPr>
+        <p:spPr>
+          <a:xfrm>
+            <a:off x="11003669" y="1746397"/>
+            <a:ext cx="779668" cy="210038"/>
+          </a:xfrm>
+          <a:prstGeom prst="roundRect">
+            <a:avLst/>
+          </a:prstGeom>
+          <a:noFill/>
+          <a:ln>
+            <a:solidFill>
+              <a:schemeClr val="accent2">
+                <a:lumMod val="60000"/>
+                <a:lumOff val="40000"/>
+              </a:schemeClr>
+            </a:solidFill>
+          </a:ln>
+        </p:spPr>
+        <p:style>
+          <a:lnRef idx="2">
+            <a:schemeClr val="accent1">
+              <a:shade val="15000"/>
+            </a:schemeClr>
+          </a:lnRef>
+          <a:fillRef idx="1">
+            <a:schemeClr val="accent1"/>
+          </a:fillRef>
+          <a:effectRef idx="0">
+            <a:schemeClr val="accent1"/>
+          </a:effectRef>
+          <a:fontRef idx="minor">
+            <a:schemeClr val="lt1"/>
+          </a:fontRef>
+        </p:style>
+        <p:txBody>
+          <a:bodyPr rtlCol="0" anchor="ctr"/>
+          <a:lstStyle/>
+          <a:p>
+            <a:pPr algn="ctr"/>
+            <a:r>
+              <a:rPr lang="en-US" b="1" dirty="0">
+                <a:solidFill>
+                  <a:schemeClr val="tx1"/>
+                </a:solidFill>
+              </a:rPr>
+              <a:t>B1</a:t>
+            </a:r>
+          </a:p>
+        </p:txBody>
+      </p:sp>
+      <p:sp>
+        <p:nvSpPr>
+          <p:cNvPr id="46" name="Rectangle: Rounded Corners 45">
+            <a:extLst>
+              <a:ext uri="{FF2B5EF4-FFF2-40B4-BE49-F238E27FC236}">
+                <a16:creationId xmlns:a16="http://schemas.microsoft.com/office/drawing/2014/main" id="{3ABBCC71-2678-140D-ACB8-FCD2B7A68789}"/>
+              </a:ext>
+            </a:extLst>
+          </p:cNvPr>
+          <p:cNvSpPr/>
+          <p:nvPr/>
+        </p:nvSpPr>
+        <p:spPr>
+          <a:xfrm>
+            <a:off x="11003669" y="2072562"/>
+            <a:ext cx="779668" cy="210038"/>
+          </a:xfrm>
+          <a:prstGeom prst="roundRect">
+            <a:avLst/>
+          </a:prstGeom>
+          <a:noFill/>
+          <a:ln>
+            <a:solidFill>
+              <a:schemeClr val="accent2">
+                <a:lumMod val="60000"/>
+                <a:lumOff val="40000"/>
+              </a:schemeClr>
+            </a:solidFill>
+          </a:ln>
+        </p:spPr>
+        <p:style>
+          <a:lnRef idx="2">
+            <a:schemeClr val="accent1">
+              <a:shade val="15000"/>
+            </a:schemeClr>
+          </a:lnRef>
+          <a:fillRef idx="1">
+            <a:schemeClr val="accent1"/>
+          </a:fillRef>
+          <a:effectRef idx="0">
+            <a:schemeClr val="accent1"/>
+          </a:effectRef>
+          <a:fontRef idx="minor">
+            <a:schemeClr val="lt1"/>
+          </a:fontRef>
+        </p:style>
+        <p:txBody>
+          <a:bodyPr rtlCol="0" anchor="ctr"/>
+          <a:lstStyle/>
+          <a:p>
+            <a:pPr algn="ctr"/>
+            <a:r>
+              <a:rPr lang="en-US" b="1" dirty="0">
+                <a:solidFill>
+                  <a:schemeClr val="tx1"/>
+                </a:solidFill>
+              </a:rPr>
+              <a:t>HV</a:t>
+            </a:r>
+          </a:p>
+        </p:txBody>
+      </p:sp>
+      <p:sp>
+        <p:nvSpPr>
+          <p:cNvPr id="47" name="Rectangle: Rounded Corners 46">
+            <a:extLst>
+              <a:ext uri="{FF2B5EF4-FFF2-40B4-BE49-F238E27FC236}">
+                <a16:creationId xmlns:a16="http://schemas.microsoft.com/office/drawing/2014/main" id="{397C353C-D7EE-1C99-378E-A0155E2A3CF7}"/>
+              </a:ext>
+            </a:extLst>
+          </p:cNvPr>
+          <p:cNvSpPr/>
+          <p:nvPr/>
+        </p:nvSpPr>
+        <p:spPr>
+          <a:xfrm>
+            <a:off x="11003669" y="2424987"/>
+            <a:ext cx="779668" cy="210038"/>
+          </a:xfrm>
+          <a:prstGeom prst="roundRect">
+            <a:avLst/>
+          </a:prstGeom>
+          <a:noFill/>
+          <a:ln>
+            <a:solidFill>
+              <a:schemeClr val="accent2">
+                <a:lumMod val="60000"/>
+                <a:lumOff val="40000"/>
+              </a:schemeClr>
+            </a:solidFill>
+          </a:ln>
+        </p:spPr>
+        <p:style>
+          <a:lnRef idx="2">
+            <a:schemeClr val="accent1">
+              <a:shade val="15000"/>
+            </a:schemeClr>
+          </a:lnRef>
+          <a:fillRef idx="1">
+            <a:schemeClr val="accent1"/>
+          </a:fillRef>
+          <a:effectRef idx="0">
+            <a:schemeClr val="accent1"/>
+          </a:effectRef>
+          <a:fontRef idx="minor">
+            <a:schemeClr val="lt1"/>
+          </a:fontRef>
+        </p:style>
+        <p:txBody>
+          <a:bodyPr rtlCol="0" anchor="ctr"/>
+          <a:lstStyle/>
+          <a:p>
+            <a:pPr algn="ctr"/>
+            <a:r>
+              <a:rPr lang="en-US" b="1" dirty="0">
+                <a:solidFill>
+                  <a:schemeClr val="tx1"/>
+                </a:solidFill>
+              </a:rPr>
+              <a:t>D1</a:t>
+            </a:r>
+          </a:p>
+        </p:txBody>
+      </p:sp>
+      <p:sp>
+        <p:nvSpPr>
+          <p:cNvPr id="48" name="Rectangle: Rounded Corners 47">
+            <a:extLst>
+              <a:ext uri="{FF2B5EF4-FFF2-40B4-BE49-F238E27FC236}">
+                <a16:creationId xmlns:a16="http://schemas.microsoft.com/office/drawing/2014/main" id="{06434B9E-408E-A816-BF9C-4CA1F9716727}"/>
+              </a:ext>
+            </a:extLst>
+          </p:cNvPr>
+          <p:cNvSpPr/>
+          <p:nvPr/>
+        </p:nvSpPr>
+        <p:spPr>
+          <a:xfrm>
+            <a:off x="11003669" y="2777412"/>
+            <a:ext cx="779668" cy="210038"/>
+          </a:xfrm>
+          <a:prstGeom prst="roundRect">
+            <a:avLst/>
+          </a:prstGeom>
+          <a:noFill/>
+          <a:ln>
+            <a:solidFill>
+              <a:schemeClr val="accent2">
+                <a:lumMod val="60000"/>
+                <a:lumOff val="40000"/>
+              </a:schemeClr>
+            </a:solidFill>
+          </a:ln>
+        </p:spPr>
+        <p:style>
+          <a:lnRef idx="2">
+            <a:schemeClr val="accent1">
+              <a:shade val="15000"/>
+            </a:schemeClr>
+          </a:lnRef>
+          <a:fillRef idx="1">
+            <a:schemeClr val="accent1"/>
+          </a:fillRef>
+          <a:effectRef idx="0">
+            <a:schemeClr val="accent1"/>
+          </a:effectRef>
+          <a:fontRef idx="minor">
+            <a:schemeClr val="lt1"/>
+          </a:fontRef>
+        </p:style>
+        <p:txBody>
+          <a:bodyPr rtlCol="0" anchor="ctr"/>
+          <a:lstStyle/>
+          <a:p>
+            <a:pPr algn="ctr"/>
+            <a:r>
+              <a:rPr lang="en-US" b="1" dirty="0">
+                <a:solidFill>
+                  <a:schemeClr val="tx1"/>
+                </a:solidFill>
+              </a:rPr>
+              <a:t>D2</a:t>
+            </a:r>
+          </a:p>
+        </p:txBody>
+      </p:sp>
+      <p:sp>
+        <p:nvSpPr>
+          <p:cNvPr id="49" name="Rectangle: Rounded Corners 48">
+            <a:extLst>
+              <a:ext uri="{FF2B5EF4-FFF2-40B4-BE49-F238E27FC236}">
+                <a16:creationId xmlns:a16="http://schemas.microsoft.com/office/drawing/2014/main" id="{2EA335EA-C189-FAF6-1C31-0527BCEF6E36}"/>
+              </a:ext>
+            </a:extLst>
+          </p:cNvPr>
+          <p:cNvSpPr/>
+          <p:nvPr/>
+        </p:nvSpPr>
+        <p:spPr>
+          <a:xfrm>
+            <a:off x="11003669" y="3129837"/>
+            <a:ext cx="779668" cy="210038"/>
+          </a:xfrm>
+          <a:prstGeom prst="roundRect">
+            <a:avLst/>
+          </a:prstGeom>
+          <a:noFill/>
+          <a:ln>
+            <a:solidFill>
+              <a:schemeClr val="accent2">
+                <a:lumMod val="60000"/>
+                <a:lumOff val="40000"/>
+              </a:schemeClr>
+            </a:solidFill>
+          </a:ln>
+        </p:spPr>
+        <p:style>
+          <a:lnRef idx="2">
+            <a:schemeClr val="accent1">
+              <a:shade val="15000"/>
+            </a:schemeClr>
+          </a:lnRef>
+          <a:fillRef idx="1">
+            <a:schemeClr val="accent1"/>
+          </a:fillRef>
+          <a:effectRef idx="0">
+            <a:schemeClr val="accent1"/>
+          </a:effectRef>
+          <a:fontRef idx="minor">
+            <a:schemeClr val="lt1"/>
+          </a:fontRef>
+        </p:style>
+        <p:txBody>
+          <a:bodyPr rtlCol="0" anchor="ctr"/>
+          <a:lstStyle/>
+          <a:p>
+            <a:pPr algn="ctr"/>
+            <a:r>
+              <a:rPr lang="en-US" b="1" dirty="0">
+                <a:solidFill>
+                  <a:schemeClr val="tx1"/>
+                </a:solidFill>
+              </a:rPr>
+              <a:t>D3</a:t>
+            </a:r>
+          </a:p>
+        </p:txBody>
+      </p:sp>
+      <p:sp>
+        <p:nvSpPr>
+          <p:cNvPr id="50" name="Rectangle: Rounded Corners 49">
+            <a:extLst>
+              <a:ext uri="{FF2B5EF4-FFF2-40B4-BE49-F238E27FC236}">
+                <a16:creationId xmlns:a16="http://schemas.microsoft.com/office/drawing/2014/main" id="{C50A731F-9E4D-0613-2077-68E60856331E}"/>
+              </a:ext>
+            </a:extLst>
+          </p:cNvPr>
+          <p:cNvSpPr/>
+          <p:nvPr/>
+        </p:nvSpPr>
+        <p:spPr>
+          <a:xfrm>
+            <a:off x="11003669" y="3447126"/>
+            <a:ext cx="779668" cy="210038"/>
+          </a:xfrm>
+          <a:prstGeom prst="roundRect">
+            <a:avLst/>
+          </a:prstGeom>
+          <a:noFill/>
+          <a:ln>
+            <a:solidFill>
+              <a:schemeClr val="accent2">
+                <a:lumMod val="60000"/>
+                <a:lumOff val="40000"/>
+              </a:schemeClr>
+            </a:solidFill>
+          </a:ln>
+        </p:spPr>
+        <p:style>
+          <a:lnRef idx="2">
+            <a:schemeClr val="accent1">
+              <a:shade val="15000"/>
+            </a:schemeClr>
+          </a:lnRef>
+          <a:fillRef idx="1">
+            <a:schemeClr val="accent1"/>
+          </a:fillRef>
+          <a:effectRef idx="0">
+            <a:schemeClr val="accent1"/>
+          </a:effectRef>
+          <a:fontRef idx="minor">
+            <a:schemeClr val="lt1"/>
+          </a:fontRef>
+        </p:style>
+        <p:txBody>
+          <a:bodyPr rtlCol="0" anchor="ctr"/>
+          <a:lstStyle/>
+          <a:p>
+            <a:pPr algn="ctr"/>
+            <a:r>
+              <a:rPr lang="en-US" b="1" dirty="0">
+                <a:solidFill>
+                  <a:schemeClr val="tx1"/>
+                </a:solidFill>
+              </a:rPr>
+              <a:t>D4</a:t>
+            </a:r>
+          </a:p>
+        </p:txBody>
+      </p:sp>
+      <p:sp>
+        <p:nvSpPr>
+          <p:cNvPr id="51" name="Rectangle: Rounded Corners 50">
+            <a:extLst>
+              <a:ext uri="{FF2B5EF4-FFF2-40B4-BE49-F238E27FC236}">
+                <a16:creationId xmlns:a16="http://schemas.microsoft.com/office/drawing/2014/main" id="{F4BD5024-0846-B6A6-711D-9A58D9C3FBE5}"/>
+              </a:ext>
+            </a:extLst>
+          </p:cNvPr>
+          <p:cNvSpPr/>
+          <p:nvPr/>
+        </p:nvSpPr>
+        <p:spPr>
+          <a:xfrm>
+            <a:off x="11003669" y="3799551"/>
+            <a:ext cx="779668" cy="210038"/>
+          </a:xfrm>
+          <a:prstGeom prst="roundRect">
+            <a:avLst/>
+          </a:prstGeom>
+          <a:noFill/>
+          <a:ln>
+            <a:solidFill>
+              <a:schemeClr val="accent2">
+                <a:lumMod val="60000"/>
+                <a:lumOff val="40000"/>
+              </a:schemeClr>
+            </a:solidFill>
+          </a:ln>
+        </p:spPr>
+        <p:style>
+          <a:lnRef idx="2">
+            <a:schemeClr val="accent1">
+              <a:shade val="15000"/>
+            </a:schemeClr>
+          </a:lnRef>
+          <a:fillRef idx="1">
+            <a:schemeClr val="accent1"/>
+          </a:fillRef>
+          <a:effectRef idx="0">
+            <a:schemeClr val="accent1"/>
+          </a:effectRef>
+          <a:fontRef idx="minor">
+            <a:schemeClr val="lt1"/>
+          </a:fontRef>
+        </p:style>
+        <p:txBody>
+          <a:bodyPr rtlCol="0" anchor="ctr"/>
+          <a:lstStyle/>
+          <a:p>
+            <a:pPr algn="ctr"/>
+            <a:r>
+              <a:rPr lang="en-US" b="1" dirty="0">
+                <a:solidFill>
+                  <a:schemeClr val="tx1"/>
+                </a:solidFill>
+              </a:rPr>
+              <a:t>D5</a:t>
+            </a:r>
+          </a:p>
+        </p:txBody>
+      </p:sp>
+      <p:sp>
+        <p:nvSpPr>
+          <p:cNvPr id="52" name="Rectangle: Rounded Corners 51">
+            <a:extLst>
+              <a:ext uri="{FF2B5EF4-FFF2-40B4-BE49-F238E27FC236}">
+                <a16:creationId xmlns:a16="http://schemas.microsoft.com/office/drawing/2014/main" id="{1BE675F5-8C7C-8D8C-90C7-318CBF3AE83B}"/>
+              </a:ext>
+            </a:extLst>
+          </p:cNvPr>
+          <p:cNvSpPr/>
+          <p:nvPr/>
+        </p:nvSpPr>
+        <p:spPr>
+          <a:xfrm>
+            <a:off x="11003669" y="4151976"/>
+            <a:ext cx="779668" cy="210038"/>
+          </a:xfrm>
+          <a:prstGeom prst="roundRect">
+            <a:avLst/>
+          </a:prstGeom>
+          <a:noFill/>
+          <a:ln>
+            <a:solidFill>
+              <a:schemeClr val="accent2">
+                <a:lumMod val="60000"/>
+                <a:lumOff val="40000"/>
+              </a:schemeClr>
+            </a:solidFill>
+          </a:ln>
+        </p:spPr>
+        <p:style>
+          <a:lnRef idx="2">
+            <a:schemeClr val="accent1">
+              <a:shade val="15000"/>
+            </a:schemeClr>
+          </a:lnRef>
+          <a:fillRef idx="1">
+            <a:schemeClr val="accent1"/>
+          </a:fillRef>
+          <a:effectRef idx="0">
+            <a:schemeClr val="accent1"/>
+          </a:effectRef>
+          <a:fontRef idx="minor">
+            <a:schemeClr val="lt1"/>
+          </a:fontRef>
+        </p:style>
+        <p:txBody>
+          <a:bodyPr rtlCol="0" anchor="ctr"/>
+          <a:lstStyle/>
+          <a:p>
+            <a:pPr algn="ctr"/>
+            <a:r>
+              <a:rPr lang="en-US" b="1" dirty="0">
+                <a:solidFill>
+                  <a:schemeClr val="tx1"/>
+                </a:solidFill>
+              </a:rPr>
+              <a:t>D6</a:t>
+            </a:r>
+          </a:p>
+        </p:txBody>
+      </p:sp>
+      <p:sp>
+        <p:nvSpPr>
+          <p:cNvPr id="53" name="Rectangle: Rounded Corners 52">
+            <a:extLst>
+              <a:ext uri="{FF2B5EF4-FFF2-40B4-BE49-F238E27FC236}">
+                <a16:creationId xmlns:a16="http://schemas.microsoft.com/office/drawing/2014/main" id="{23A42B1E-D06F-C30D-4FF1-94067DC21B2A}"/>
+              </a:ext>
+            </a:extLst>
+          </p:cNvPr>
+          <p:cNvSpPr/>
+          <p:nvPr/>
+        </p:nvSpPr>
+        <p:spPr>
+          <a:xfrm>
+            <a:off x="11003669" y="4504401"/>
+            <a:ext cx="779668" cy="210038"/>
+          </a:xfrm>
+          <a:prstGeom prst="roundRect">
+            <a:avLst/>
+          </a:prstGeom>
+          <a:noFill/>
+          <a:ln>
+            <a:solidFill>
+              <a:schemeClr val="accent2">
+                <a:lumMod val="60000"/>
+                <a:lumOff val="40000"/>
+              </a:schemeClr>
+            </a:solidFill>
+          </a:ln>
+        </p:spPr>
+        <p:style>
+          <a:lnRef idx="2">
+            <a:schemeClr val="accent1">
+              <a:shade val="15000"/>
+            </a:schemeClr>
+          </a:lnRef>
+          <a:fillRef idx="1">
+            <a:schemeClr val="accent1"/>
+          </a:fillRef>
+          <a:effectRef idx="0">
+            <a:schemeClr val="accent1"/>
+          </a:effectRef>
+          <a:fontRef idx="minor">
+            <a:schemeClr val="lt1"/>
+          </a:fontRef>
+        </p:style>
+        <p:txBody>
+          <a:bodyPr rtlCol="0" anchor="ctr"/>
+          <a:lstStyle/>
+          <a:p>
+            <a:pPr algn="ctr"/>
+            <a:r>
+              <a:rPr lang="en-US" b="1" dirty="0">
+                <a:solidFill>
+                  <a:schemeClr val="tx1"/>
+                </a:solidFill>
+              </a:rPr>
+              <a:t>D7</a:t>
+            </a:r>
+          </a:p>
+        </p:txBody>
+      </p:sp>
+      <p:sp>
+        <p:nvSpPr>
+          <p:cNvPr id="54" name="Rectangle: Rounded Corners 53">
+            <a:extLst>
+              <a:ext uri="{FF2B5EF4-FFF2-40B4-BE49-F238E27FC236}">
+                <a16:creationId xmlns:a16="http://schemas.microsoft.com/office/drawing/2014/main" id="{798BF1DE-D868-B4D7-D5C7-65321B835B5D}"/>
+              </a:ext>
+            </a:extLst>
+          </p:cNvPr>
+          <p:cNvSpPr/>
+          <p:nvPr/>
+        </p:nvSpPr>
+        <p:spPr>
+          <a:xfrm>
+            <a:off x="11003669" y="4821690"/>
+            <a:ext cx="779668" cy="210038"/>
+          </a:xfrm>
+          <a:prstGeom prst="roundRect">
+            <a:avLst/>
+          </a:prstGeom>
+          <a:noFill/>
+          <a:ln>
+            <a:solidFill>
+              <a:schemeClr val="accent2">
+                <a:lumMod val="60000"/>
+                <a:lumOff val="40000"/>
+              </a:schemeClr>
+            </a:solidFill>
+          </a:ln>
+        </p:spPr>
+        <p:style>
+          <a:lnRef idx="2">
+            <a:schemeClr val="accent1">
+              <a:shade val="15000"/>
+            </a:schemeClr>
+          </a:lnRef>
+          <a:fillRef idx="1">
+            <a:schemeClr val="accent1"/>
+          </a:fillRef>
+          <a:effectRef idx="0">
+            <a:schemeClr val="accent1"/>
+          </a:effectRef>
+          <a:fontRef idx="minor">
+            <a:schemeClr val="lt1"/>
+          </a:fontRef>
+        </p:style>
+        <p:txBody>
+          <a:bodyPr rtlCol="0" anchor="ctr"/>
+          <a:lstStyle/>
+          <a:p>
+            <a:pPr algn="ctr"/>
+            <a:r>
+              <a:rPr lang="en-US" b="1" dirty="0">
+                <a:solidFill>
+                  <a:schemeClr val="tx1"/>
+                </a:solidFill>
+              </a:rPr>
+              <a:t>D8</a:t>
+            </a:r>
+          </a:p>
+        </p:txBody>
+      </p:sp>
+      <p:sp>
+        <p:nvSpPr>
+          <p:cNvPr id="55" name="Rectangle: Rounded Corners 54">
+            <a:extLst>
+              <a:ext uri="{FF2B5EF4-FFF2-40B4-BE49-F238E27FC236}">
+                <a16:creationId xmlns:a16="http://schemas.microsoft.com/office/drawing/2014/main" id="{893FEC5C-B23B-49C1-E0F7-C10AB73CE4AA}"/>
+              </a:ext>
+            </a:extLst>
+          </p:cNvPr>
+          <p:cNvSpPr/>
+          <p:nvPr/>
+        </p:nvSpPr>
+        <p:spPr>
+          <a:xfrm>
+            <a:off x="11003669" y="5174115"/>
+            <a:ext cx="779668" cy="210038"/>
+          </a:xfrm>
+          <a:prstGeom prst="roundRect">
+            <a:avLst/>
+          </a:prstGeom>
+          <a:noFill/>
+          <a:ln>
+            <a:solidFill>
+              <a:schemeClr val="accent2">
+                <a:lumMod val="60000"/>
+                <a:lumOff val="40000"/>
+              </a:schemeClr>
+            </a:solidFill>
+          </a:ln>
+        </p:spPr>
+        <p:style>
+          <a:lnRef idx="2">
+            <a:schemeClr val="accent1">
+              <a:shade val="15000"/>
+            </a:schemeClr>
+          </a:lnRef>
+          <a:fillRef idx="1">
+            <a:schemeClr val="accent1"/>
+          </a:fillRef>
+          <a:effectRef idx="0">
+            <a:schemeClr val="accent1"/>
+          </a:effectRef>
+          <a:fontRef idx="minor">
+            <a:schemeClr val="lt1"/>
+          </a:fontRef>
+        </p:style>
+        <p:txBody>
+          <a:bodyPr rtlCol="0" anchor="ctr"/>
+          <a:lstStyle/>
+          <a:p>
+            <a:pPr algn="ctr"/>
+            <a:r>
+              <a:rPr lang="en-US" b="1" dirty="0">
+                <a:solidFill>
+                  <a:schemeClr val="tx1"/>
+                </a:solidFill>
+              </a:rPr>
+              <a:t>D9</a:t>
+            </a:r>
+          </a:p>
+        </p:txBody>
+      </p:sp>
+      <p:sp>
+        <p:nvSpPr>
+          <p:cNvPr id="56" name="Rectangle: Rounded Corners 55">
+            <a:extLst>
+              <a:ext uri="{FF2B5EF4-FFF2-40B4-BE49-F238E27FC236}">
+                <a16:creationId xmlns:a16="http://schemas.microsoft.com/office/drawing/2014/main" id="{40AD6F1D-E8FA-79AD-4333-6D68F289EC4C}"/>
+              </a:ext>
+            </a:extLst>
+          </p:cNvPr>
+          <p:cNvSpPr/>
+          <p:nvPr/>
+        </p:nvSpPr>
+        <p:spPr>
+          <a:xfrm>
+            <a:off x="11003669" y="5526540"/>
+            <a:ext cx="779668" cy="210038"/>
+          </a:xfrm>
+          <a:prstGeom prst="roundRect">
+            <a:avLst/>
+          </a:prstGeom>
+          <a:noFill/>
+          <a:ln>
+            <a:solidFill>
+              <a:schemeClr val="accent2">
+                <a:lumMod val="60000"/>
+                <a:lumOff val="40000"/>
+              </a:schemeClr>
+            </a:solidFill>
+          </a:ln>
+        </p:spPr>
+        <p:style>
+          <a:lnRef idx="2">
+            <a:schemeClr val="accent1">
+              <a:shade val="15000"/>
+            </a:schemeClr>
+          </a:lnRef>
+          <a:fillRef idx="1">
+            <a:schemeClr val="accent1"/>
+          </a:fillRef>
+          <a:effectRef idx="0">
+            <a:schemeClr val="accent1"/>
+          </a:effectRef>
+          <a:fontRef idx="minor">
+            <a:schemeClr val="lt1"/>
+          </a:fontRef>
+        </p:style>
+        <p:txBody>
+          <a:bodyPr rtlCol="0" anchor="ctr"/>
+          <a:lstStyle/>
+          <a:p>
+            <a:pPr algn="ctr"/>
+            <a:r>
+              <a:rPr lang="en-US" b="1" dirty="0">
+                <a:solidFill>
+                  <a:schemeClr val="tx1"/>
+                </a:solidFill>
+              </a:rPr>
+              <a:t>D10</a:t>
+            </a:r>
+          </a:p>
+        </p:txBody>
+      </p:sp>
+      <p:sp>
+        <p:nvSpPr>
+          <p:cNvPr id="57" name="Rectangle: Rounded Corners 56">
+            <a:extLst>
+              <a:ext uri="{FF2B5EF4-FFF2-40B4-BE49-F238E27FC236}">
+                <a16:creationId xmlns:a16="http://schemas.microsoft.com/office/drawing/2014/main" id="{9E5F1A34-DC27-7AD0-FA1E-62084AD3A4F3}"/>
+              </a:ext>
+            </a:extLst>
+          </p:cNvPr>
+          <p:cNvSpPr/>
+          <p:nvPr/>
+        </p:nvSpPr>
+        <p:spPr>
+          <a:xfrm>
+            <a:off x="11003669" y="5878965"/>
+            <a:ext cx="779668" cy="210038"/>
+          </a:xfrm>
+          <a:prstGeom prst="roundRect">
+            <a:avLst/>
+          </a:prstGeom>
+          <a:noFill/>
+          <a:ln>
+            <a:solidFill>
+              <a:schemeClr val="accent2">
+                <a:lumMod val="60000"/>
+                <a:lumOff val="40000"/>
+              </a:schemeClr>
+            </a:solidFill>
+          </a:ln>
+        </p:spPr>
+        <p:style>
+          <a:lnRef idx="2">
+            <a:schemeClr val="accent1">
+              <a:shade val="15000"/>
+            </a:schemeClr>
+          </a:lnRef>
+          <a:fillRef idx="1">
+            <a:schemeClr val="accent1"/>
+          </a:fillRef>
+          <a:effectRef idx="0">
+            <a:schemeClr val="accent1"/>
+          </a:effectRef>
+          <a:fontRef idx="minor">
+            <a:schemeClr val="lt1"/>
+          </a:fontRef>
+        </p:style>
+        <p:txBody>
+          <a:bodyPr rtlCol="0" anchor="ctr"/>
+          <a:lstStyle/>
+          <a:p>
+            <a:pPr algn="ctr"/>
+            <a:r>
+              <a:rPr lang="en-US" b="1" dirty="0">
+                <a:solidFill>
+                  <a:schemeClr val="tx1"/>
+                </a:solidFill>
+              </a:rPr>
+              <a:t>D11</a:t>
+            </a:r>
+          </a:p>
+        </p:txBody>
+      </p:sp>
+    </p:spTree>
+    <p:extLst>
+      <p:ext uri="{BB962C8B-B14F-4D97-AF65-F5344CB8AC3E}">
+        <p14:creationId xmlns:p14="http://schemas.microsoft.com/office/powerpoint/2010/main" val="1749829247"/>
+      </p:ext>
+    </p:extLst>
+  </p:cSld>
+  <p:clrMapOvr>
+    <a:masterClrMapping/>
+  </p:clrMapOvr>
+</p:sld>
+</file>
+
 <file path=ppt/theme/theme1.xml><?xml version="1.0" encoding="utf-8"?>
 <a:theme xmlns:a="http://schemas.openxmlformats.org/drawingml/2006/main" name="Office Theme">
   <a:themeElements>

</xml_diff>